<commit_message>
Add Lecture 15 materials including slides and new PDE visualizations
</commit_message>
<xml_diff>
--- a/slides/Lecture14-03-03-25-MolecularDynamics.pptx
+++ b/slides/Lecture14-03-03-25-MolecularDynamics.pptx
@@ -5,21 +5,22 @@
     <p:sldMasterId id="2147483660" r:id="rId1"/>
   </p:sldMasterIdLst>
   <p:notesMasterIdLst>
-    <p:notesMasterId r:id="rId14"/>
+    <p:notesMasterId r:id="rId15"/>
   </p:notesMasterIdLst>
   <p:sldIdLst>
     <p:sldId id="259" r:id="rId2"/>
     <p:sldId id="727" r:id="rId3"/>
     <p:sldId id="963" r:id="rId4"/>
     <p:sldId id="964" r:id="rId5"/>
-    <p:sldId id="965" r:id="rId6"/>
-    <p:sldId id="966" r:id="rId7"/>
-    <p:sldId id="725" r:id="rId8"/>
-    <p:sldId id="967" r:id="rId9"/>
-    <p:sldId id="968" r:id="rId10"/>
-    <p:sldId id="969" r:id="rId11"/>
-    <p:sldId id="970" r:id="rId12"/>
-    <p:sldId id="971" r:id="rId13"/>
+    <p:sldId id="972" r:id="rId6"/>
+    <p:sldId id="965" r:id="rId7"/>
+    <p:sldId id="966" r:id="rId8"/>
+    <p:sldId id="725" r:id="rId9"/>
+    <p:sldId id="967" r:id="rId10"/>
+    <p:sldId id="968" r:id="rId11"/>
+    <p:sldId id="969" r:id="rId12"/>
+    <p:sldId id="970" r:id="rId13"/>
+    <p:sldId id="971" r:id="rId14"/>
   </p:sldIdLst>
   <p:sldSz cx="12192000" cy="6858000"/>
   <p:notesSz cx="7102475" cy="10234613"/>
@@ -127,6 +128,7 @@
             <p14:sldId id="727"/>
             <p14:sldId id="963"/>
             <p14:sldId id="964"/>
+            <p14:sldId id="972"/>
             <p14:sldId id="965"/>
             <p14:sldId id="966"/>
             <p14:sldId id="725"/>
@@ -247,7 +249,7 @@
           <a:p>
             <a:fld id="{961AF02B-09B0-4980-983D-27C0EDB561B5}" type="datetimeFigureOut">
               <a:rPr lang="uk-UA" smtClean="0"/>
-              <a:t>03.03.25</a:t>
+              <a:t>04.03.25</a:t>
             </a:fld>
             <a:endParaRPr lang="uk-UA"/>
           </a:p>
@@ -751,7 +753,7 @@
     </p:spTree>
     <p:extLst>
       <p:ext uri="{BB962C8B-B14F-4D97-AF65-F5344CB8AC3E}">
-        <p14:creationId xmlns:p14="http://schemas.microsoft.com/office/powerpoint/2010/main" val="2507549047"/>
+        <p14:creationId xmlns:p14="http://schemas.microsoft.com/office/powerpoint/2010/main" val="4007449863"/>
       </p:ext>
     </p:extLst>
   </p:cSld>
@@ -913,7 +915,7 @@
     </p:spTree>
     <p:extLst>
       <p:ext uri="{BB962C8B-B14F-4D97-AF65-F5344CB8AC3E}">
-        <p14:creationId xmlns:p14="http://schemas.microsoft.com/office/powerpoint/2010/main" val="660206164"/>
+        <p14:creationId xmlns:p14="http://schemas.microsoft.com/office/powerpoint/2010/main" val="2507549047"/>
       </p:ext>
     </p:extLst>
   </p:cSld>
@@ -1067,6 +1069,168 @@
             <a:fld id="{2F0C5EC2-2CF5-460B-AE73-90022B24A426}" type="slidenum">
               <a:rPr lang="uk-UA" smtClean="0"/>
               <a:t>12</a:t>
+            </a:fld>
+            <a:endParaRPr lang="uk-UA"/>
+          </a:p>
+        </p:txBody>
+      </p:sp>
+    </p:spTree>
+    <p:extLst>
+      <p:ext uri="{BB962C8B-B14F-4D97-AF65-F5344CB8AC3E}">
+        <p14:creationId xmlns:p14="http://schemas.microsoft.com/office/powerpoint/2010/main" val="660206164"/>
+      </p:ext>
+    </p:extLst>
+  </p:cSld>
+  <p:clrMapOvr>
+    <a:masterClrMapping/>
+  </p:clrMapOvr>
+</p:notes>
+</file>
+
+<file path=ppt/notesSlides/notesSlide13.xml><?xml version="1.0" encoding="utf-8"?>
+<p:notes xmlns:a="http://schemas.openxmlformats.org/drawingml/2006/main" xmlns:r="http://schemas.openxmlformats.org/officeDocument/2006/relationships" xmlns:p="http://schemas.openxmlformats.org/presentationml/2006/main">
+  <p:cSld>
+    <p:spTree>
+      <p:nvGrpSpPr>
+        <p:cNvPr id="1" name=""/>
+        <p:cNvGrpSpPr/>
+        <p:nvPr/>
+      </p:nvGrpSpPr>
+      <p:grpSpPr>
+        <a:xfrm>
+          <a:off x="0" y="0"/>
+          <a:ext cx="0" cy="0"/>
+          <a:chOff x="0" y="0"/>
+          <a:chExt cx="0" cy="0"/>
+        </a:xfrm>
+      </p:grpSpPr>
+      <p:sp>
+        <p:nvSpPr>
+          <p:cNvPr id="2" name="Slide Image Placeholder 1"/>
+          <p:cNvSpPr>
+            <a:spLocks noGrp="1" noRot="1" noChangeAspect="1"/>
+          </p:cNvSpPr>
+          <p:nvPr>
+            <p:ph type="sldImg"/>
+          </p:nvPr>
+        </p:nvSpPr>
+        <p:spPr/>
+      </p:sp>
+      <p:sp>
+        <p:nvSpPr>
+          <p:cNvPr id="3" name="Notes Placeholder 2"/>
+          <p:cNvSpPr>
+            <a:spLocks noGrp="1"/>
+          </p:cNvSpPr>
+          <p:nvPr>
+            <p:ph type="body" idx="1"/>
+          </p:nvPr>
+        </p:nvSpPr>
+        <p:spPr/>
+        <p:txBody>
+          <a:bodyPr/>
+          <a:lstStyle/>
+          <a:p>
+            <a:r>
+              <a:rPr lang="en-US" dirty="0"/>
+              <a:t>The important thing here, however, is that this equation defines how the mean B1 depends on t.</a:t>
+            </a:r>
+          </a:p>
+          <a:p>
+            <a:r>
+              <a:rPr lang="en-US" dirty="0"/>
+              <a:t>We can thus use this straightforwardly to calculate the higher-order cumulants by taking the derivatives from this equation with respect to t.</a:t>
+            </a:r>
+          </a:p>
+          <a:p>
+            <a:r>
+              <a:rPr lang="en-US" dirty="0"/>
+              <a:t>And by repeatedly abusing the </a:t>
+            </a:r>
+            <a:r>
+              <a:rPr lang="en-US" dirty="0" err="1"/>
+              <a:t>Faa</a:t>
+            </a:r>
+            <a:r>
+              <a:rPr lang="en-US" dirty="0"/>
+              <a:t> di Bruno formula for high-order derivatives of composite functions we can calculate the net-baryon cumulants subject to global baryon conservation up to a desired order.</a:t>
+            </a:r>
+          </a:p>
+          <a:p>
+            <a:endParaRPr lang="en-US" dirty="0"/>
+          </a:p>
+          <a:p>
+            <a:r>
+              <a:rPr lang="en-US" dirty="0"/>
+              <a:t>Here I am showing the results for three cumulants ratios, the so-called scaled variance, skewness, and kurtosis, our paper contains explicit results up to order 6.</a:t>
+            </a:r>
+          </a:p>
+          <a:p>
+            <a:r>
+              <a:rPr lang="en-US" dirty="0"/>
+              <a:t>We obtain the B1 cumulants in terms of the </a:t>
+            </a:r>
+            <a:r>
+              <a:rPr lang="en-US" dirty="0" err="1"/>
+              <a:t>subvolume</a:t>
+            </a:r>
+            <a:r>
+              <a:rPr lang="en-US" dirty="0"/>
+              <a:t> fraction \alpha and the grand-canonical susceptibilities \</a:t>
+            </a:r>
+            <a:r>
+              <a:rPr lang="en-US" dirty="0" err="1"/>
+              <a:t>chi_B</a:t>
+            </a:r>
+            <a:r>
+              <a:rPr lang="en-US" dirty="0"/>
+              <a:t>.</a:t>
+            </a:r>
+          </a:p>
+          <a:p>
+            <a:r>
+              <a:rPr lang="en-US" dirty="0"/>
+              <a:t>This is exactly what we want, as the grand-canonical susceptibilities are the intrinsic properties of the equation of state that we want to probe. </a:t>
+            </a:r>
+          </a:p>
+          <a:p>
+            <a:r>
+              <a:rPr lang="en-US" dirty="0"/>
+              <a:t>Unsurprisingly, in the limit \alpha goes to zero we obtain the grand-canonical susceptibility ratios.</a:t>
+            </a:r>
+          </a:p>
+          <a:p>
+            <a:endParaRPr lang="en-US" dirty="0"/>
+          </a:p>
+          <a:p>
+            <a:r>
+              <a:rPr lang="en-US" dirty="0"/>
+              <a:t>Let me reiterate again that here I did not assume anything about the equation of state, this result is model-independent.</a:t>
+            </a:r>
+          </a:p>
+          <a:p>
+            <a:endParaRPr lang="en-US" dirty="0"/>
+          </a:p>
+        </p:txBody>
+      </p:sp>
+      <p:sp>
+        <p:nvSpPr>
+          <p:cNvPr id="4" name="Slide Number Placeholder 3"/>
+          <p:cNvSpPr>
+            <a:spLocks noGrp="1"/>
+          </p:cNvSpPr>
+          <p:nvPr>
+            <p:ph type="sldNum" sz="quarter" idx="5"/>
+          </p:nvPr>
+        </p:nvSpPr>
+        <p:spPr/>
+        <p:txBody>
+          <a:bodyPr/>
+          <a:lstStyle/>
+          <a:p>
+            <a:fld id="{2F0C5EC2-2CF5-460B-AE73-90022B24A426}" type="slidenum">
+              <a:rPr lang="uk-UA" smtClean="0"/>
+              <a:t>13</a:t>
             </a:fld>
             <a:endParaRPr lang="uk-UA"/>
           </a:p>
@@ -1576,7 +1740,13 @@
   <p:cSld>
     <p:spTree>
       <p:nvGrpSpPr>
-        <p:cNvPr id="1" name=""/>
+        <p:cNvPr id="1" name="">
+          <a:extLst>
+            <a:ext uri="{FF2B5EF4-FFF2-40B4-BE49-F238E27FC236}">
+              <a16:creationId xmlns:a16="http://schemas.microsoft.com/office/drawing/2014/main" id="{6AC1986A-001A-B504-2F18-C9FCDC9ABAE6}"/>
+            </a:ext>
+          </a:extLst>
+        </p:cNvPr>
         <p:cNvGrpSpPr/>
         <p:nvPr/>
       </p:nvGrpSpPr>
@@ -1590,7 +1760,13 @@
       </p:grpSpPr>
       <p:sp>
         <p:nvSpPr>
-          <p:cNvPr id="2" name="Slide Image Placeholder 1"/>
+          <p:cNvPr id="2" name="Slide Image Placeholder 1">
+            <a:extLst>
+              <a:ext uri="{FF2B5EF4-FFF2-40B4-BE49-F238E27FC236}">
+                <a16:creationId xmlns:a16="http://schemas.microsoft.com/office/drawing/2014/main" id="{54F23F98-9C65-9A93-4E47-2D56DB2F3454}"/>
+              </a:ext>
+            </a:extLst>
+          </p:cNvPr>
           <p:cNvSpPr>
             <a:spLocks noGrp="1" noRot="1" noChangeAspect="1"/>
           </p:cNvSpPr>
@@ -1602,7 +1778,13 @@
       </p:sp>
       <p:sp>
         <p:nvSpPr>
-          <p:cNvPr id="3" name="Notes Placeholder 2"/>
+          <p:cNvPr id="3" name="Notes Placeholder 2">
+            <a:extLst>
+              <a:ext uri="{FF2B5EF4-FFF2-40B4-BE49-F238E27FC236}">
+                <a16:creationId xmlns:a16="http://schemas.microsoft.com/office/drawing/2014/main" id="{2CB149AF-8298-9EB9-410B-0CADA4E6C7F9}"/>
+              </a:ext>
+            </a:extLst>
+          </p:cNvPr>
           <p:cNvSpPr>
             <a:spLocks noGrp="1"/>
           </p:cNvSpPr>
@@ -1699,7 +1881,13 @@
       </p:sp>
       <p:sp>
         <p:nvSpPr>
-          <p:cNvPr id="4" name="Slide Number Placeholder 3"/>
+          <p:cNvPr id="4" name="Slide Number Placeholder 3">
+            <a:extLst>
+              <a:ext uri="{FF2B5EF4-FFF2-40B4-BE49-F238E27FC236}">
+                <a16:creationId xmlns:a16="http://schemas.microsoft.com/office/drawing/2014/main" id="{719A7700-FFDB-EC2E-C417-24EC64C46AFA}"/>
+              </a:ext>
+            </a:extLst>
+          </p:cNvPr>
           <p:cNvSpPr>
             <a:spLocks noGrp="1"/>
           </p:cNvSpPr>
@@ -1723,7 +1911,7 @@
     </p:spTree>
     <p:extLst>
       <p:ext uri="{BB962C8B-B14F-4D97-AF65-F5344CB8AC3E}">
-        <p14:creationId xmlns:p14="http://schemas.microsoft.com/office/powerpoint/2010/main" val="3412189841"/>
+        <p14:creationId xmlns:p14="http://schemas.microsoft.com/office/powerpoint/2010/main" val="1418239822"/>
       </p:ext>
     </p:extLst>
   </p:cSld>
@@ -1885,7 +2073,7 @@
     </p:spTree>
     <p:extLst>
       <p:ext uri="{BB962C8B-B14F-4D97-AF65-F5344CB8AC3E}">
-        <p14:creationId xmlns:p14="http://schemas.microsoft.com/office/powerpoint/2010/main" val="3813523947"/>
+        <p14:creationId xmlns:p14="http://schemas.microsoft.com/office/powerpoint/2010/main" val="3412189841"/>
       </p:ext>
     </p:extLst>
   </p:cSld>
@@ -2047,7 +2235,7 @@
     </p:spTree>
     <p:extLst>
       <p:ext uri="{BB962C8B-B14F-4D97-AF65-F5344CB8AC3E}">
-        <p14:creationId xmlns:p14="http://schemas.microsoft.com/office/powerpoint/2010/main" val="4112969314"/>
+        <p14:creationId xmlns:p14="http://schemas.microsoft.com/office/powerpoint/2010/main" val="3813523947"/>
       </p:ext>
     </p:extLst>
   </p:cSld>
@@ -2209,7 +2397,7 @@
     </p:spTree>
     <p:extLst>
       <p:ext uri="{BB962C8B-B14F-4D97-AF65-F5344CB8AC3E}">
-        <p14:creationId xmlns:p14="http://schemas.microsoft.com/office/powerpoint/2010/main" val="211400138"/>
+        <p14:creationId xmlns:p14="http://schemas.microsoft.com/office/powerpoint/2010/main" val="4112969314"/>
       </p:ext>
     </p:extLst>
   </p:cSld>
@@ -2371,7 +2559,7 @@
     </p:spTree>
     <p:extLst>
       <p:ext uri="{BB962C8B-B14F-4D97-AF65-F5344CB8AC3E}">
-        <p14:creationId xmlns:p14="http://schemas.microsoft.com/office/powerpoint/2010/main" val="4007449863"/>
+        <p14:creationId xmlns:p14="http://schemas.microsoft.com/office/powerpoint/2010/main" val="211400138"/>
       </p:ext>
     </p:extLst>
   </p:cSld>
@@ -6006,7 +6194,7 @@
               <a:rPr lang="en-US" dirty="0">
                 <a:latin typeface="LM Sans 10" panose="00000500000000000000" pitchFamily="50" charset="0"/>
               </a:rPr>
-              <a:t>March 3, 2025</a:t>
+              <a:t>March 4, 2025</a:t>
             </a:r>
             <a:endParaRPr lang="uk-UA" dirty="0"/>
           </a:p>
@@ -6159,6 +6347,435 @@
 </file>
 
 <file path=ppt/slides/slide10.xml><?xml version="1.0" encoding="utf-8"?>
+<p:sld xmlns:a="http://schemas.openxmlformats.org/drawingml/2006/main" xmlns:r="http://schemas.openxmlformats.org/officeDocument/2006/relationships" xmlns:p="http://schemas.openxmlformats.org/presentationml/2006/main">
+  <p:cSld>
+    <p:spTree>
+      <p:nvGrpSpPr>
+        <p:cNvPr id="1" name=""/>
+        <p:cNvGrpSpPr/>
+        <p:nvPr/>
+      </p:nvGrpSpPr>
+      <p:grpSpPr>
+        <a:xfrm>
+          <a:off x="0" y="0"/>
+          <a:ext cx="0" cy="0"/>
+          <a:chOff x="0" y="0"/>
+          <a:chExt cx="0" cy="0"/>
+        </a:xfrm>
+      </p:grpSpPr>
+      <p:sp>
+        <p:nvSpPr>
+          <p:cNvPr id="2" name="Title 1">
+            <a:extLst>
+              <a:ext uri="{FF2B5EF4-FFF2-40B4-BE49-F238E27FC236}">
+                <a16:creationId xmlns:a16="http://schemas.microsoft.com/office/drawing/2014/main" id="{D2AAFA58-9F0A-4217-B38D-E58CFC4CAD2A}"/>
+              </a:ext>
+            </a:extLst>
+          </p:cNvPr>
+          <p:cNvSpPr>
+            <a:spLocks noGrp="1"/>
+          </p:cNvSpPr>
+          <p:nvPr>
+            <p:ph type="title"/>
+          </p:nvPr>
+        </p:nvSpPr>
+        <p:spPr/>
+        <p:txBody>
+          <a:bodyPr/>
+          <a:lstStyle/>
+          <a:p>
+            <a:r>
+              <a:rPr lang="en-US" dirty="0">
+                <a:latin typeface="LM Sans 10" panose="00000500000000000000" pitchFamily="50" charset="0"/>
+              </a:rPr>
+              <a:t>Simulation: Initial conditions</a:t>
+            </a:r>
+            <a:endParaRPr lang="uk-UA" dirty="0"/>
+          </a:p>
+        </p:txBody>
+      </p:sp>
+      <p:sp>
+        <p:nvSpPr>
+          <p:cNvPr id="4" name="Text Placeholder 3">
+            <a:extLst>
+              <a:ext uri="{FF2B5EF4-FFF2-40B4-BE49-F238E27FC236}">
+                <a16:creationId xmlns:a16="http://schemas.microsoft.com/office/drawing/2014/main" id="{22379093-2446-7E14-8100-7BE52B6E3AF4}"/>
+              </a:ext>
+            </a:extLst>
+          </p:cNvPr>
+          <p:cNvSpPr>
+            <a:spLocks noGrp="1"/>
+          </p:cNvSpPr>
+          <p:nvPr>
+            <p:ph type="body" sz="quarter" idx="12"/>
+          </p:nvPr>
+        </p:nvSpPr>
+        <p:spPr/>
+        <p:txBody>
+          <a:bodyPr/>
+          <a:lstStyle/>
+          <a:p>
+            <a:endParaRPr lang="en-US"/>
+          </a:p>
+        </p:txBody>
+      </p:sp>
+      <p:sp>
+        <p:nvSpPr>
+          <p:cNvPr id="5" name="Rectangle 4">
+            <a:extLst>
+              <a:ext uri="{FF2B5EF4-FFF2-40B4-BE49-F238E27FC236}">
+                <a16:creationId xmlns:a16="http://schemas.microsoft.com/office/drawing/2014/main" id="{413D0C7C-906D-884B-F42E-8F17A179BC22}"/>
+              </a:ext>
+            </a:extLst>
+          </p:cNvPr>
+          <p:cNvSpPr/>
+          <p:nvPr/>
+        </p:nvSpPr>
+        <p:spPr>
+          <a:xfrm>
+            <a:off x="767980" y="1251691"/>
+            <a:ext cx="8949226" cy="400110"/>
+          </a:xfrm>
+          <a:prstGeom prst="rect">
+            <a:avLst/>
+          </a:prstGeom>
+        </p:spPr>
+        <p:txBody>
+          <a:bodyPr wrap="square">
+            <a:spAutoFit/>
+          </a:bodyPr>
+          <a:lstStyle/>
+          <a:p>
+            <a:pPr algn="just">
+              <a:spcAft>
+                <a:spcPts val="600"/>
+              </a:spcAft>
+              <a:buClr>
+                <a:srgbClr val="0808FF"/>
+              </a:buClr>
+            </a:pPr>
+            <a:r>
+              <a:rPr lang="en-US" sz="2000" dirty="0"/>
+              <a:t>We have to initialize the system with initial positions and velocities </a:t>
+            </a:r>
+          </a:p>
+        </p:txBody>
+      </p:sp>
+      <mc:AlternateContent xmlns:mc="http://schemas.openxmlformats.org/markup-compatibility/2006" xmlns:a14="http://schemas.microsoft.com/office/drawing/2010/main">
+        <mc:Choice Requires="a14">
+          <p:sp>
+            <p:nvSpPr>
+              <p:cNvPr id="3" name="Rectangle 2">
+                <a:extLst>
+                  <a:ext uri="{FF2B5EF4-FFF2-40B4-BE49-F238E27FC236}">
+                    <a16:creationId xmlns:a16="http://schemas.microsoft.com/office/drawing/2014/main" id="{5E12AD3C-1994-608C-C002-36764A0F17EB}"/>
+                  </a:ext>
+                </a:extLst>
+              </p:cNvPr>
+              <p:cNvSpPr/>
+              <p:nvPr/>
+            </p:nvSpPr>
+            <p:spPr>
+              <a:xfrm>
+                <a:off x="767980" y="1777130"/>
+                <a:ext cx="6165083" cy="3859967"/>
+              </a:xfrm>
+              <a:prstGeom prst="rect">
+                <a:avLst/>
+              </a:prstGeom>
+            </p:spPr>
+            <p:txBody>
+              <a:bodyPr wrap="square">
+                <a:spAutoFit/>
+              </a:bodyPr>
+              <a:lstStyle/>
+              <a:p>
+                <a:pPr marL="342900" indent="-342900" algn="just">
+                  <a:spcAft>
+                    <a:spcPts val="600"/>
+                  </a:spcAft>
+                  <a:buClr>
+                    <a:srgbClr val="0808FF"/>
+                  </a:buClr>
+                  <a:buFont typeface="Arial" panose="020B0604020202020204" pitchFamily="34" charset="0"/>
+                  <a:buChar char="•"/>
+                </a:pPr>
+                <a:r>
+                  <a:rPr lang="en-US" sz="2000" dirty="0"/>
+                  <a:t>Coordinates</a:t>
+                </a:r>
+              </a:p>
+              <a:p>
+                <a:pPr marL="800100" lvl="1" indent="-342900" algn="just">
+                  <a:spcAft>
+                    <a:spcPts val="600"/>
+                  </a:spcAft>
+                  <a:buClr>
+                    <a:srgbClr val="0808FF"/>
+                  </a:buClr>
+                  <a:buFont typeface="Arial" panose="020B0604020202020204" pitchFamily="34" charset="0"/>
+                  <a:buChar char="•"/>
+                </a:pPr>
+                <a:r>
+                  <a:rPr lang="en-US" sz="2000" dirty="0"/>
+                  <a:t>Put particles in a grid</a:t>
+                </a:r>
+              </a:p>
+              <a:p>
+                <a:pPr marL="800100" lvl="1" indent="-342900" algn="just">
+                  <a:spcAft>
+                    <a:spcPts val="600"/>
+                  </a:spcAft>
+                  <a:buClr>
+                    <a:srgbClr val="0808FF"/>
+                  </a:buClr>
+                  <a:buFont typeface="Arial" panose="020B0604020202020204" pitchFamily="34" charset="0"/>
+                  <a:buChar char="•"/>
+                </a:pPr>
+                <a:r>
+                  <a:rPr lang="en-US" sz="2000" dirty="0"/>
+                  <a:t>Avoids particle overlap (mind the </a:t>
+                </a:r>
+                <a14:m>
+                  <m:oMath xmlns:m="http://schemas.openxmlformats.org/officeDocument/2006/math">
+                    <m:sSup>
+                      <m:sSupPr>
+                        <m:ctrlPr>
+                          <a:rPr lang="en-US" sz="2000" b="0" i="1" smtClean="0">
+                            <a:latin typeface="Cambria Math" panose="02040503050406030204" pitchFamily="18" charset="0"/>
+                          </a:rPr>
+                        </m:ctrlPr>
+                      </m:sSupPr>
+                      <m:e>
+                        <m:r>
+                          <a:rPr lang="en-US" sz="2000" b="0" i="1" smtClean="0">
+                            <a:latin typeface="Cambria Math" panose="02040503050406030204" pitchFamily="18" charset="0"/>
+                          </a:rPr>
+                          <m:t>𝑟</m:t>
+                        </m:r>
+                      </m:e>
+                      <m:sup>
+                        <m:r>
+                          <a:rPr lang="en-US" sz="2000" b="0" i="1" smtClean="0">
+                            <a:latin typeface="Cambria Math" panose="02040503050406030204" pitchFamily="18" charset="0"/>
+                          </a:rPr>
+                          <m:t>−12</m:t>
+                        </m:r>
+                      </m:sup>
+                    </m:sSup>
+                  </m:oMath>
+                </a14:m>
+                <a:r>
+                  <a:rPr lang="en-US" sz="2000" dirty="0"/>
+                  <a:t> term)</a:t>
+                </a:r>
+              </a:p>
+              <a:p>
+                <a:pPr marL="800100" lvl="1" indent="-342900" algn="just">
+                  <a:spcAft>
+                    <a:spcPts val="600"/>
+                  </a:spcAft>
+                  <a:buClr>
+                    <a:srgbClr val="0808FF"/>
+                  </a:buClr>
+                  <a:buFont typeface="Arial" panose="020B0604020202020204" pitchFamily="34" charset="0"/>
+                  <a:buChar char="•"/>
+                </a:pPr>
+                <a:endParaRPr lang="en-US" sz="2000" dirty="0"/>
+              </a:p>
+              <a:p>
+                <a:pPr marL="800100" lvl="1" indent="-342900" algn="just">
+                  <a:spcAft>
+                    <a:spcPts val="600"/>
+                  </a:spcAft>
+                  <a:buClr>
+                    <a:srgbClr val="0808FF"/>
+                  </a:buClr>
+                  <a:buFont typeface="Arial" panose="020B0604020202020204" pitchFamily="34" charset="0"/>
+                  <a:buChar char="•"/>
+                </a:pPr>
+                <a:endParaRPr lang="en-US" sz="2000" dirty="0"/>
+              </a:p>
+              <a:p>
+                <a:pPr marL="800100" lvl="1" indent="-342900" algn="just">
+                  <a:spcAft>
+                    <a:spcPts val="600"/>
+                  </a:spcAft>
+                  <a:buClr>
+                    <a:srgbClr val="0808FF"/>
+                  </a:buClr>
+                  <a:buFont typeface="Arial" panose="020B0604020202020204" pitchFamily="34" charset="0"/>
+                  <a:buChar char="•"/>
+                </a:pPr>
+                <a:endParaRPr lang="en-US" sz="2000" dirty="0"/>
+              </a:p>
+              <a:p>
+                <a:pPr marL="800100" lvl="1" indent="-342900" algn="just">
+                  <a:spcAft>
+                    <a:spcPts val="600"/>
+                  </a:spcAft>
+                  <a:buClr>
+                    <a:srgbClr val="0808FF"/>
+                  </a:buClr>
+                  <a:buFont typeface="Arial" panose="020B0604020202020204" pitchFamily="34" charset="0"/>
+                  <a:buChar char="•"/>
+                </a:pPr>
+                <a:endParaRPr lang="en-US" sz="2000" dirty="0"/>
+              </a:p>
+              <a:p>
+                <a:pPr marL="342900" indent="-342900" algn="just">
+                  <a:spcAft>
+                    <a:spcPts val="600"/>
+                  </a:spcAft>
+                  <a:buClr>
+                    <a:srgbClr val="0808FF"/>
+                  </a:buClr>
+                  <a:buFont typeface="Arial" panose="020B0604020202020204" pitchFamily="34" charset="0"/>
+                  <a:buChar char="•"/>
+                </a:pPr>
+                <a:r>
+                  <a:rPr lang="en-US" sz="2000" dirty="0"/>
+                  <a:t>Velocities</a:t>
+                </a:r>
+              </a:p>
+              <a:p>
+                <a:pPr marL="800100" lvl="1" indent="-342900" algn="just">
+                  <a:spcAft>
+                    <a:spcPts val="600"/>
+                  </a:spcAft>
+                  <a:buClr>
+                    <a:srgbClr val="0808FF"/>
+                  </a:buClr>
+                  <a:buFont typeface="Arial" panose="020B0604020202020204" pitchFamily="34" charset="0"/>
+                  <a:buChar char="•"/>
+                </a:pPr>
+                <a:r>
+                  <a:rPr lang="en-US" sz="2000" dirty="0"/>
+                  <a:t>Sample each component from Gaussian (Maxwell-Boltzmann) distribution</a:t>
+                </a:r>
+              </a:p>
+            </p:txBody>
+          </p:sp>
+        </mc:Choice>
+        <mc:Fallback xmlns="">
+          <p:sp>
+            <p:nvSpPr>
+              <p:cNvPr id="3" name="Rectangle 2">
+                <a:extLst>
+                  <a:ext uri="{FF2B5EF4-FFF2-40B4-BE49-F238E27FC236}">
+                    <a16:creationId xmlns:a16="http://schemas.microsoft.com/office/drawing/2014/main" id="{5E12AD3C-1994-608C-C002-36764A0F17EB}"/>
+                  </a:ext>
+                </a:extLst>
+              </p:cNvPr>
+              <p:cNvSpPr>
+                <a:spLocks noRot="1" noChangeAspect="1" noMove="1" noResize="1" noEditPoints="1" noAdjustHandles="1" noChangeArrowheads="1" noChangeShapeType="1" noTextEdit="1"/>
+              </p:cNvSpPr>
+              <p:nvPr/>
+            </p:nvSpPr>
+            <p:spPr>
+              <a:xfrm>
+                <a:off x="767980" y="1777130"/>
+                <a:ext cx="6165083" cy="3859967"/>
+              </a:xfrm>
+              <a:prstGeom prst="rect">
+                <a:avLst/>
+              </a:prstGeom>
+              <a:blipFill>
+                <a:blip r:embed="rId3"/>
+                <a:stretch>
+                  <a:fillRect l="-823" t="-984" r="-1235"/>
+                </a:stretch>
+              </a:blipFill>
+            </p:spPr>
+            <p:txBody>
+              <a:bodyPr/>
+              <a:lstStyle/>
+              <a:p>
+                <a:r>
+                  <a:rPr lang="en-US">
+                    <a:noFill/>
+                  </a:rPr>
+                  <a:t> </a:t>
+                </a:r>
+              </a:p>
+            </p:txBody>
+          </p:sp>
+        </mc:Fallback>
+      </mc:AlternateContent>
+      <p:pic>
+        <p:nvPicPr>
+          <p:cNvPr id="8" name="Picture 7">
+            <a:extLst>
+              <a:ext uri="{FF2B5EF4-FFF2-40B4-BE49-F238E27FC236}">
+                <a16:creationId xmlns:a16="http://schemas.microsoft.com/office/drawing/2014/main" id="{746C2BF3-A322-92BF-9A6A-C64D7A913774}"/>
+              </a:ext>
+            </a:extLst>
+          </p:cNvPr>
+          <p:cNvPicPr>
+            <a:picLocks noChangeAspect="1"/>
+          </p:cNvPicPr>
+          <p:nvPr/>
+        </p:nvPicPr>
+        <p:blipFill>
+          <a:blip r:embed="rId4"/>
+          <a:stretch>
+            <a:fillRect/>
+          </a:stretch>
+        </p:blipFill>
+        <p:spPr>
+          <a:xfrm>
+            <a:off x="7841770" y="2091634"/>
+            <a:ext cx="3532507" cy="1932265"/>
+          </a:xfrm>
+          <a:prstGeom prst="rect">
+            <a:avLst/>
+          </a:prstGeom>
+        </p:spPr>
+      </p:pic>
+      <p:pic>
+        <p:nvPicPr>
+          <p:cNvPr id="9" name="Picture 8">
+            <a:extLst>
+              <a:ext uri="{FF2B5EF4-FFF2-40B4-BE49-F238E27FC236}">
+                <a16:creationId xmlns:a16="http://schemas.microsoft.com/office/drawing/2014/main" id="{91CB83CD-4C2A-2951-3047-FB81CA877047}"/>
+              </a:ext>
+            </a:extLst>
+          </p:cNvPr>
+          <p:cNvPicPr>
+            <a:picLocks noChangeAspect="1"/>
+          </p:cNvPicPr>
+          <p:nvPr/>
+        </p:nvPicPr>
+        <p:blipFill>
+          <a:blip r:embed="rId5"/>
+          <a:stretch>
+            <a:fillRect/>
+          </a:stretch>
+        </p:blipFill>
+        <p:spPr>
+          <a:xfrm>
+            <a:off x="1352868" y="5946153"/>
+            <a:ext cx="6711218" cy="342909"/>
+          </a:xfrm>
+          <a:prstGeom prst="rect">
+            <a:avLst/>
+          </a:prstGeom>
+        </p:spPr>
+      </p:pic>
+    </p:spTree>
+    <p:extLst>
+      <p:ext uri="{BB962C8B-B14F-4D97-AF65-F5344CB8AC3E}">
+        <p14:creationId xmlns:p14="http://schemas.microsoft.com/office/powerpoint/2010/main" val="809637653"/>
+      </p:ext>
+    </p:extLst>
+  </p:cSld>
+  <p:clrMapOvr>
+    <a:masterClrMapping/>
+  </p:clrMapOvr>
+</p:sld>
+</file>
+
+<file path=ppt/slides/slide11.xml><?xml version="1.0" encoding="utf-8"?>
 <p:sld xmlns:a="http://schemas.openxmlformats.org/drawingml/2006/main" xmlns:r="http://schemas.openxmlformats.org/officeDocument/2006/relationships" xmlns:p="http://schemas.openxmlformats.org/presentationml/2006/main">
   <p:cSld>
     <p:spTree>
@@ -6601,7 +7218,7 @@
 </p:sld>
 </file>
 
-<file path=ppt/slides/slide11.xml><?xml version="1.0" encoding="utf-8"?>
+<file path=ppt/slides/slide12.xml><?xml version="1.0" encoding="utf-8"?>
 <p:sld xmlns:a="http://schemas.openxmlformats.org/drawingml/2006/main" xmlns:r="http://schemas.openxmlformats.org/officeDocument/2006/relationships" xmlns:p="http://schemas.openxmlformats.org/presentationml/2006/main">
   <p:cSld>
     <p:spTree>
@@ -7034,6 +7651,87 @@
           </a:extLst>
         </p:spPr>
       </p:pic>
+      <p:sp>
+        <p:nvSpPr>
+          <p:cNvPr id="3" name="Rectangle 2">
+            <a:extLst>
+              <a:ext uri="{FF2B5EF4-FFF2-40B4-BE49-F238E27FC236}">
+                <a16:creationId xmlns:a16="http://schemas.microsoft.com/office/drawing/2014/main" id="{EE9EE0A8-B416-0F54-3655-CCFA8B1DB628}"/>
+              </a:ext>
+            </a:extLst>
+          </p:cNvPr>
+          <p:cNvSpPr/>
+          <p:nvPr/>
+        </p:nvSpPr>
+        <p:spPr>
+          <a:xfrm>
+            <a:off x="767979" y="5860437"/>
+            <a:ext cx="9911351" cy="400110"/>
+          </a:xfrm>
+          <a:prstGeom prst="rect">
+            <a:avLst/>
+          </a:prstGeom>
+        </p:spPr>
+        <p:txBody>
+          <a:bodyPr wrap="square">
+            <a:spAutoFit/>
+          </a:bodyPr>
+          <a:lstStyle/>
+          <a:p>
+            <a:pPr algn="just">
+              <a:spcAft>
+                <a:spcPts val="600"/>
+              </a:spcAft>
+              <a:buClr>
+                <a:srgbClr val="0808FF"/>
+              </a:buClr>
+            </a:pPr>
+            <a:r>
+              <a:rPr lang="en-US" sz="2000" dirty="0"/>
+              <a:t>More involved approaches: thermostat degrees of freedom (Berendsen, Nose-Hoover, …)</a:t>
+            </a:r>
+          </a:p>
+        </p:txBody>
+      </p:sp>
+      <p:sp>
+        <p:nvSpPr>
+          <p:cNvPr id="6" name="TextBox 5">
+            <a:extLst>
+              <a:ext uri="{FF2B5EF4-FFF2-40B4-BE49-F238E27FC236}">
+                <a16:creationId xmlns:a16="http://schemas.microsoft.com/office/drawing/2014/main" id="{A749E10A-8A20-007D-A39A-485F7F3E2D5E}"/>
+              </a:ext>
+            </a:extLst>
+          </p:cNvPr>
+          <p:cNvSpPr txBox="1"/>
+          <p:nvPr/>
+        </p:nvSpPr>
+        <p:spPr>
+          <a:xfrm>
+            <a:off x="7787085" y="6162137"/>
+            <a:ext cx="2148345" cy="369332"/>
+          </a:xfrm>
+          <a:prstGeom prst="rect">
+            <a:avLst/>
+          </a:prstGeom>
+          <a:noFill/>
+        </p:spPr>
+        <p:txBody>
+          <a:bodyPr wrap="none" rtlCol="0">
+            <a:spAutoFit/>
+          </a:bodyPr>
+          <a:lstStyle/>
+          <a:p>
+            <a:r>
+              <a:rPr lang="en-US" i="1" dirty="0">
+                <a:solidFill>
+                  <a:srgbClr val="FF0000"/>
+                </a:solidFill>
+              </a:rPr>
+              <a:t>final project idea(?)</a:t>
+            </a:r>
+          </a:p>
+        </p:txBody>
+      </p:sp>
     </p:spTree>
     <p:extLst>
       <p:ext uri="{BB962C8B-B14F-4D97-AF65-F5344CB8AC3E}">
@@ -7047,7 +7745,7 @@
 </p:sld>
 </file>
 
-<file path=ppt/slides/slide12.xml><?xml version="1.0" encoding="utf-8"?>
+<file path=ppt/slides/slide13.xml><?xml version="1.0" encoding="utf-8"?>
 <p:sld xmlns:a="http://schemas.openxmlformats.org/drawingml/2006/main" xmlns:r="http://schemas.openxmlformats.org/officeDocument/2006/relationships" xmlns:p="http://schemas.openxmlformats.org/presentationml/2006/main">
   <p:cSld>
     <p:spTree>
@@ -7455,7 +8153,7 @@
         <p:spPr>
           <a:xfrm>
             <a:off x="767980" y="1251691"/>
-            <a:ext cx="7111081" cy="5514330"/>
+            <a:ext cx="10749106" cy="4247317"/>
           </a:xfrm>
           <a:prstGeom prst="rect">
             <a:avLst/>
@@ -7555,15 +8253,23 @@
               <a:buFont typeface="Arial" panose="020B0604020202020204" pitchFamily="34" charset="0"/>
               <a:buChar char="•"/>
             </a:pPr>
+            <a:endParaRPr lang="en-US" sz="2000" dirty="0"/>
+          </a:p>
+          <a:p>
+            <a:pPr marL="342900" indent="-342900" algn="just">
+              <a:spcAft>
+                <a:spcPts val="600"/>
+              </a:spcAft>
+              <a:buClr>
+                <a:srgbClr val="0808FF"/>
+              </a:buClr>
+              <a:buFont typeface="Arial" panose="020B0604020202020204" pitchFamily="34" charset="0"/>
+              <a:buChar char="•"/>
+            </a:pPr>
             <a:r>
               <a:rPr lang="en-US" sz="2000" dirty="0"/>
-              <a:t>Box simulation</a:t>
-            </a:r>
-            <a:endParaRPr lang="en-US" sz="2000" dirty="0">
-              <a:solidFill>
-                <a:srgbClr val="0808FF"/>
-              </a:solidFill>
-            </a:endParaRPr>
+              <a:t>Planetary motion</a:t>
+            </a:r>
           </a:p>
           <a:p>
             <a:pPr marL="800100" lvl="1" indent="-342900" algn="just">
@@ -7578,37 +8284,8 @@
             </a:pPr>
             <a:r>
               <a:rPr lang="en-US" sz="1600" dirty="0"/>
-              <a:t>Periodic boundary conditions</a:t>
-            </a:r>
-          </a:p>
-          <a:p>
-            <a:pPr marL="800100" lvl="1" indent="-342900" algn="just">
-              <a:spcAft>
-                <a:spcPts val="1200"/>
-              </a:spcAft>
-              <a:buClr>
-                <a:srgbClr val="0808FF"/>
-              </a:buClr>
-              <a:buFont typeface="Arial" panose="020B0604020202020204" pitchFamily="34" charset="0"/>
-              <a:buChar char="•"/>
-            </a:pPr>
-            <a:r>
-              <a:rPr lang="en-US" sz="1600" dirty="0"/>
-              <a:t>Minimum-image convention</a:t>
-            </a:r>
-          </a:p>
-          <a:p>
-            <a:pPr marL="800100" lvl="1" indent="-342900" algn="just">
-              <a:spcAft>
-                <a:spcPts val="1200"/>
-              </a:spcAft>
-              <a:buClr>
-                <a:srgbClr val="0808FF"/>
-              </a:buClr>
-              <a:buFont typeface="Arial" panose="020B0604020202020204" pitchFamily="34" charset="0"/>
-              <a:buChar char="•"/>
-            </a:pPr>
-            <a:endParaRPr lang="en-US" sz="2000" dirty="0"/>
+              <a:t>Solar system simulation</a:t>
+            </a:r>
           </a:p>
           <a:p>
             <a:pPr marL="342900" indent="-342900" algn="just">
@@ -7621,17 +8298,26 @@
               <a:buFont typeface="Arial" panose="020B0604020202020204" pitchFamily="34" charset="0"/>
               <a:buChar char="•"/>
             </a:pPr>
+            <a:endParaRPr lang="en-US" sz="2000" dirty="0"/>
+          </a:p>
+          <a:p>
+            <a:pPr marL="342900" indent="-342900" algn="just">
+              <a:spcAft>
+                <a:spcPts val="600"/>
+              </a:spcAft>
+              <a:buClr>
+                <a:srgbClr val="0808FF"/>
+              </a:buClr>
+              <a:buFont typeface="Arial" panose="020B0604020202020204" pitchFamily="34" charset="0"/>
+              <a:buChar char="•"/>
+            </a:pPr>
             <a:r>
               <a:rPr lang="en-US" sz="2000" dirty="0"/>
-              <a:t>If </a:t>
-            </a:r>
-            <a:r>
-              <a:rPr lang="en-US" sz="2000" i="1" dirty="0"/>
-              <a:t>N</a:t>
-            </a:r>
-            <a:r>
-              <a:rPr lang="en-US" sz="2000" dirty="0"/>
-              <a:t> is large enough, system can be characterized by macroscopic parameters</a:t>
+              <a:t>Statistical mechanics properties and the </a:t>
+            </a:r>
+            <a:r>
+              <a:rPr lang="en-US" sz="2000" b="1" dirty="0"/>
+              <a:t>equation of state</a:t>
             </a:r>
           </a:p>
           <a:p>
@@ -7647,57 +8333,7 @@
             </a:pPr>
             <a:r>
               <a:rPr lang="en-US" sz="1600" dirty="0"/>
-              <a:t>Energy-Volume-Number (UVN), microcanonical ensemble</a:t>
-            </a:r>
-          </a:p>
-          <a:p>
-            <a:pPr marL="800100" lvl="1" indent="-342900" algn="just">
-              <a:spcAft>
-                <a:spcPts val="600"/>
-              </a:spcAft>
-              <a:buClr>
-                <a:srgbClr val="0808FF"/>
-              </a:buClr>
-              <a:buFont typeface="Arial" panose="020B0604020202020204" pitchFamily="34" charset="0"/>
-              <a:buChar char="•"/>
-            </a:pPr>
-            <a:r>
-              <a:rPr lang="en-US" sz="1600" dirty="0"/>
-              <a:t>Temperature-Volume-Number (TVN), canonical ensemble</a:t>
-            </a:r>
-            <a:endParaRPr lang="en-US" sz="2000" dirty="0"/>
-          </a:p>
-          <a:p>
-            <a:pPr marL="342900" indent="-342900" algn="just">
-              <a:spcAft>
-                <a:spcPts val="600"/>
-              </a:spcAft>
-              <a:buClr>
-                <a:srgbClr val="0808FF"/>
-              </a:buClr>
-              <a:buFont typeface="Arial" panose="020B0604020202020204" pitchFamily="34" charset="0"/>
-              <a:buChar char="•"/>
-            </a:pPr>
-            <a:endParaRPr lang="en-US" sz="2000" baseline="30000" dirty="0"/>
-          </a:p>
-          <a:p>
-            <a:pPr marL="342900" indent="-342900" algn="just">
-              <a:spcAft>
-                <a:spcPts val="600"/>
-              </a:spcAft>
-              <a:buClr>
-                <a:srgbClr val="0808FF"/>
-              </a:buClr>
-              <a:buFont typeface="Arial" panose="020B0604020202020204" pitchFamily="34" charset="0"/>
-              <a:buChar char="•"/>
-            </a:pPr>
-            <a:r>
-              <a:rPr lang="en-US" sz="2000" dirty="0"/>
-              <a:t>MD simulations give access to the </a:t>
-            </a:r>
-            <a:r>
-              <a:rPr lang="en-US" sz="2000" b="1" dirty="0"/>
-              <a:t>equation of state</a:t>
+              <a:t>Finite simulation box with periodic boundary conditions</a:t>
             </a:r>
           </a:p>
         </p:txBody>
@@ -7762,7 +8398,7 @@
         </p:blipFill>
         <p:spPr bwMode="auto">
           <a:xfrm>
-            <a:off x="8355200" y="1382748"/>
+            <a:off x="8497137" y="3973548"/>
             <a:ext cx="2926883" cy="2325144"/>
           </a:xfrm>
           <a:prstGeom prst="rect">
@@ -7841,6 +8477,53 @@
           </a:p>
         </p:txBody>
       </p:sp>
+      <p:pic>
+        <p:nvPicPr>
+          <p:cNvPr id="1026" name="Picture 2" descr="Solar System Template | MyDraw">
+            <a:extLst>
+              <a:ext uri="{FF2B5EF4-FFF2-40B4-BE49-F238E27FC236}">
+                <a16:creationId xmlns:a16="http://schemas.microsoft.com/office/drawing/2014/main" id="{3437269D-D900-6BC7-CFFE-31E5A6AE348A}"/>
+              </a:ext>
+            </a:extLst>
+          </p:cNvPr>
+          <p:cNvPicPr>
+            <a:picLocks noChangeAspect="1" noChangeArrowheads="1"/>
+          </p:cNvPicPr>
+          <p:nvPr/>
+        </p:nvPicPr>
+        <p:blipFill>
+          <a:blip r:embed="rId6">
+            <a:extLst>
+              <a:ext uri="{28A0092B-C50C-407E-A947-70E740481C1C}">
+                <a14:useLocalDpi xmlns:a14="http://schemas.microsoft.com/office/drawing/2010/main" val="0"/>
+              </a:ext>
+            </a:extLst>
+          </a:blip>
+          <a:srcRect/>
+          <a:stretch>
+            <a:fillRect/>
+          </a:stretch>
+        </p:blipFill>
+        <p:spPr bwMode="auto">
+          <a:xfrm>
+            <a:off x="8497137" y="1284662"/>
+            <a:ext cx="3062742" cy="2356795"/>
+          </a:xfrm>
+          <a:prstGeom prst="rect">
+            <a:avLst/>
+          </a:prstGeom>
+          <a:noFill/>
+          <a:extLst>
+            <a:ext uri="{909E8E84-426E-40DD-AFC4-6F175D3DCCD1}">
+              <a14:hiddenFill xmlns:a14="http://schemas.microsoft.com/office/drawing/2010/main">
+                <a:solidFill>
+                  <a:srgbClr val="FFFFFF"/>
+                </a:solidFill>
+              </a14:hiddenFill>
+            </a:ext>
+          </a:extLst>
+        </p:spPr>
+      </p:pic>
     </p:spTree>
     <p:extLst>
       <p:ext uri="{BB962C8B-B14F-4D97-AF65-F5344CB8AC3E}">
@@ -8629,7 +9312,13 @@
   <p:cSld>
     <p:spTree>
       <p:nvGrpSpPr>
-        <p:cNvPr id="1" name=""/>
+        <p:cNvPr id="1" name="">
+          <a:extLst>
+            <a:ext uri="{FF2B5EF4-FFF2-40B4-BE49-F238E27FC236}">
+              <a16:creationId xmlns:a16="http://schemas.microsoft.com/office/drawing/2014/main" id="{DD15541F-EB10-1D66-E922-158E0EF8FF4B}"/>
+            </a:ext>
+          </a:extLst>
+        </p:cNvPr>
         <p:cNvGrpSpPr/>
         <p:nvPr/>
       </p:nvGrpSpPr>
@@ -8643,10 +9332,287 @@
       </p:grpSpPr>
       <p:sp>
         <p:nvSpPr>
+          <p:cNvPr id="16" name="Rectangle 15">
+            <a:extLst>
+              <a:ext uri="{FF2B5EF4-FFF2-40B4-BE49-F238E27FC236}">
+                <a16:creationId xmlns:a16="http://schemas.microsoft.com/office/drawing/2014/main" id="{2C412EC1-99DE-6D2B-63A5-6E98B814528F}"/>
+              </a:ext>
+            </a:extLst>
+          </p:cNvPr>
+          <p:cNvSpPr/>
+          <p:nvPr/>
+        </p:nvSpPr>
+        <p:spPr>
+          <a:xfrm>
+            <a:off x="767979" y="1251691"/>
+            <a:ext cx="11053479" cy="5452775"/>
+          </a:xfrm>
+          <a:prstGeom prst="rect">
+            <a:avLst/>
+          </a:prstGeom>
+        </p:spPr>
+        <p:txBody>
+          <a:bodyPr wrap="square">
+            <a:spAutoFit/>
+          </a:bodyPr>
+          <a:lstStyle/>
+          <a:p>
+            <a:pPr marL="342900" indent="-342900" algn="just">
+              <a:spcAft>
+                <a:spcPts val="600"/>
+              </a:spcAft>
+              <a:buClr>
+                <a:srgbClr val="0808FF"/>
+              </a:buClr>
+              <a:buFont typeface="Arial" panose="020B0604020202020204" pitchFamily="34" charset="0"/>
+              <a:buChar char="•"/>
+            </a:pPr>
+            <a:r>
+              <a:rPr lang="en-US" sz="2000" dirty="0"/>
+              <a:t>Statistical mechanics: system with large number of particles</a:t>
+            </a:r>
+          </a:p>
+          <a:p>
+            <a:pPr marL="342900" indent="-342900" algn="just">
+              <a:spcAft>
+                <a:spcPts val="600"/>
+              </a:spcAft>
+              <a:buClr>
+                <a:srgbClr val="0808FF"/>
+              </a:buClr>
+              <a:buFont typeface="Arial" panose="020B0604020202020204" pitchFamily="34" charset="0"/>
+              <a:buChar char="•"/>
+            </a:pPr>
+            <a:endParaRPr lang="en-US" sz="2000" dirty="0"/>
+          </a:p>
+          <a:p>
+            <a:pPr marL="342900" indent="-342900" algn="just">
+              <a:spcAft>
+                <a:spcPts val="600"/>
+              </a:spcAft>
+              <a:buClr>
+                <a:srgbClr val="0808FF"/>
+              </a:buClr>
+              <a:buFont typeface="Arial" panose="020B0604020202020204" pitchFamily="34" charset="0"/>
+              <a:buChar char="•"/>
+            </a:pPr>
+            <a:r>
+              <a:rPr lang="en-US" sz="2000" dirty="0"/>
+              <a:t>Microscopically: Newton’s equations of motion</a:t>
+            </a:r>
+          </a:p>
+          <a:p>
+            <a:pPr marL="342900" indent="-342900" algn="just">
+              <a:spcAft>
+                <a:spcPts val="600"/>
+              </a:spcAft>
+              <a:buClr>
+                <a:srgbClr val="0808FF"/>
+              </a:buClr>
+              <a:buFont typeface="Arial" panose="020B0604020202020204" pitchFamily="34" charset="0"/>
+              <a:buChar char="•"/>
+            </a:pPr>
+            <a:endParaRPr lang="en-US" sz="2000" dirty="0"/>
+          </a:p>
+          <a:p>
+            <a:pPr algn="just">
+              <a:spcAft>
+                <a:spcPts val="600"/>
+              </a:spcAft>
+              <a:buClr>
+                <a:srgbClr val="0808FF"/>
+              </a:buClr>
+            </a:pPr>
+            <a:endParaRPr lang="en-US" sz="2000" dirty="0"/>
+          </a:p>
+          <a:p>
+            <a:pPr marL="342900" indent="-342900" algn="just">
+              <a:spcAft>
+                <a:spcPts val="600"/>
+              </a:spcAft>
+              <a:buClr>
+                <a:srgbClr val="0808FF"/>
+              </a:buClr>
+              <a:buFont typeface="Arial" panose="020B0604020202020204" pitchFamily="34" charset="0"/>
+              <a:buChar char="•"/>
+            </a:pPr>
+            <a:r>
+              <a:rPr lang="en-US" sz="2000" dirty="0"/>
+              <a:t>Perform box simulation to emulate infinite system</a:t>
+            </a:r>
+            <a:endParaRPr lang="en-US" sz="2000" dirty="0">
+              <a:solidFill>
+                <a:srgbClr val="0808FF"/>
+              </a:solidFill>
+            </a:endParaRPr>
+          </a:p>
+          <a:p>
+            <a:pPr marL="800100" lvl="1" indent="-342900" algn="just">
+              <a:spcAft>
+                <a:spcPts val="600"/>
+              </a:spcAft>
+              <a:buClr>
+                <a:srgbClr val="0808FF"/>
+              </a:buClr>
+              <a:buFont typeface="Arial" panose="020B0604020202020204" pitchFamily="34" charset="0"/>
+              <a:buChar char="•"/>
+            </a:pPr>
+            <a:r>
+              <a:rPr lang="en-US" sz="1600" dirty="0"/>
+              <a:t>Periodic boundary conditions (create images of the system)</a:t>
+            </a:r>
+          </a:p>
+          <a:p>
+            <a:pPr marL="800100" lvl="1" indent="-342900" algn="just">
+              <a:spcAft>
+                <a:spcPts val="1200"/>
+              </a:spcAft>
+              <a:buClr>
+                <a:srgbClr val="0808FF"/>
+              </a:buClr>
+              <a:buFont typeface="Arial" panose="020B0604020202020204" pitchFamily="34" charset="0"/>
+              <a:buChar char="•"/>
+            </a:pPr>
+            <a:r>
+              <a:rPr lang="en-US" sz="1600" dirty="0"/>
+              <a:t>Minimum-image convention (consider only closest image for all pairs)</a:t>
+            </a:r>
+          </a:p>
+          <a:p>
+            <a:pPr marL="800100" lvl="1" indent="-342900" algn="just">
+              <a:spcAft>
+                <a:spcPts val="1200"/>
+              </a:spcAft>
+              <a:buClr>
+                <a:srgbClr val="0808FF"/>
+              </a:buClr>
+              <a:buFont typeface="Arial" panose="020B0604020202020204" pitchFamily="34" charset="0"/>
+              <a:buChar char="•"/>
+            </a:pPr>
+            <a:endParaRPr lang="en-US" sz="2000" dirty="0"/>
+          </a:p>
+          <a:p>
+            <a:pPr marL="342900" indent="-342900" algn="just">
+              <a:spcAft>
+                <a:spcPts val="600"/>
+              </a:spcAft>
+              <a:buClr>
+                <a:srgbClr val="0808FF"/>
+              </a:buClr>
+              <a:buFont typeface="Arial" panose="020B0604020202020204" pitchFamily="34" charset="0"/>
+              <a:buChar char="•"/>
+            </a:pPr>
+            <a:r>
+              <a:rPr lang="en-US" sz="2000" dirty="0"/>
+              <a:t>If </a:t>
+            </a:r>
+            <a:r>
+              <a:rPr lang="en-US" sz="2000" i="1" dirty="0"/>
+              <a:t>N</a:t>
+            </a:r>
+            <a:r>
+              <a:rPr lang="en-US" sz="2000" dirty="0"/>
+              <a:t> is large enough, system can be characterized by macroscopic parameters</a:t>
+            </a:r>
+          </a:p>
+          <a:p>
+            <a:pPr marL="800100" lvl="1" indent="-342900" algn="just">
+              <a:spcAft>
+                <a:spcPts val="600"/>
+              </a:spcAft>
+              <a:buClr>
+                <a:srgbClr val="0808FF"/>
+              </a:buClr>
+              <a:buFont typeface="Arial" panose="020B0604020202020204" pitchFamily="34" charset="0"/>
+              <a:buChar char="•"/>
+            </a:pPr>
+            <a:r>
+              <a:rPr lang="en-US" sz="1600" dirty="0"/>
+              <a:t>Energy-Volume-Number (UVN): </a:t>
+            </a:r>
+            <a:r>
+              <a:rPr lang="en-US" sz="1600" dirty="0">
+                <a:solidFill>
+                  <a:srgbClr val="122EA6"/>
+                </a:solidFill>
+              </a:rPr>
+              <a:t>microcanonical ensemble </a:t>
+            </a:r>
+            <a:r>
+              <a:rPr lang="en-US" sz="1600" dirty="0"/>
+              <a:t>describing closed system with fixed energy</a:t>
+            </a:r>
+          </a:p>
+          <a:p>
+            <a:pPr marL="800100" lvl="1" indent="-342900" algn="just">
+              <a:spcAft>
+                <a:spcPts val="600"/>
+              </a:spcAft>
+              <a:buClr>
+                <a:srgbClr val="0808FF"/>
+              </a:buClr>
+              <a:buFont typeface="Arial" panose="020B0604020202020204" pitchFamily="34" charset="0"/>
+              <a:buChar char="•"/>
+            </a:pPr>
+            <a:r>
+              <a:rPr lang="en-US" sz="1600" dirty="0"/>
+              <a:t>Temperature-Volume-Number (TVN): </a:t>
+            </a:r>
+            <a:r>
+              <a:rPr lang="en-US" sz="1600" dirty="0">
+                <a:solidFill>
+                  <a:srgbClr val="FF0000"/>
+                </a:solidFill>
+              </a:rPr>
+              <a:t>canonical ensemble</a:t>
+            </a:r>
+            <a:r>
+              <a:rPr lang="en-US" sz="1600" dirty="0"/>
+              <a:t> where the system is coupled to a thermostat to maintain constant temperature</a:t>
+            </a:r>
+            <a:endParaRPr lang="en-US" sz="2000" dirty="0"/>
+          </a:p>
+          <a:p>
+            <a:pPr marL="342900" indent="-342900" algn="just">
+              <a:spcAft>
+                <a:spcPts val="600"/>
+              </a:spcAft>
+              <a:buClr>
+                <a:srgbClr val="0808FF"/>
+              </a:buClr>
+              <a:buFont typeface="Arial" panose="020B0604020202020204" pitchFamily="34" charset="0"/>
+              <a:buChar char="•"/>
+            </a:pPr>
+            <a:endParaRPr lang="en-US" sz="2000" baseline="30000" dirty="0"/>
+          </a:p>
+          <a:p>
+            <a:pPr marL="342900" indent="-342900" algn="just">
+              <a:spcAft>
+                <a:spcPts val="600"/>
+              </a:spcAft>
+              <a:buClr>
+                <a:srgbClr val="0808FF"/>
+              </a:buClr>
+              <a:buFont typeface="Arial" panose="020B0604020202020204" pitchFamily="34" charset="0"/>
+              <a:buChar char="•"/>
+            </a:pPr>
+            <a:r>
+              <a:rPr lang="en-US" sz="2000" dirty="0"/>
+              <a:t>MD simulations give access to the </a:t>
+            </a:r>
+            <a:r>
+              <a:rPr lang="en-US" sz="2000" b="1" dirty="0"/>
+              <a:t>equation of state</a:t>
+            </a:r>
+          </a:p>
+        </p:txBody>
+      </p:sp>
+      <p:sp>
+        <p:nvSpPr>
           <p:cNvPr id="2" name="Title 1">
             <a:extLst>
               <a:ext uri="{FF2B5EF4-FFF2-40B4-BE49-F238E27FC236}">
-                <a16:creationId xmlns:a16="http://schemas.microsoft.com/office/drawing/2014/main" id="{D2AAFA58-9F0A-4217-B38D-E58CFC4CAD2A}"/>
+                <a16:creationId xmlns:a16="http://schemas.microsoft.com/office/drawing/2014/main" id="{DE1401DA-6708-48FC-0C6D-7E1AA8646042}"/>
               </a:ext>
             </a:extLst>
           </p:cNvPr>
@@ -8666,55 +9632,65 @@
               <a:rPr lang="en-US" dirty="0">
                 <a:latin typeface="LM Sans 10" panose="00000500000000000000" pitchFamily="50" charset="0"/>
               </a:rPr>
-              <a:t>Velocity </a:t>
-            </a:r>
-            <a:r>
-              <a:rPr lang="en-US" dirty="0" err="1">
-                <a:latin typeface="LM Sans 10" panose="00000500000000000000" pitchFamily="50" charset="0"/>
-              </a:rPr>
-              <a:t>Verlet</a:t>
-            </a:r>
-            <a:r>
-              <a:rPr lang="en-US" dirty="0">
-                <a:latin typeface="LM Sans 10" panose="00000500000000000000" pitchFamily="50" charset="0"/>
-              </a:rPr>
-              <a:t> method</a:t>
+              <a:t>Box simulation and statistical mechanics</a:t>
             </a:r>
             <a:endParaRPr lang="uk-UA" dirty="0"/>
-          </a:p>
-        </p:txBody>
-      </p:sp>
-      <p:sp>
-        <p:nvSpPr>
-          <p:cNvPr id="4" name="Text Placeholder 3">
-            <a:extLst>
-              <a:ext uri="{FF2B5EF4-FFF2-40B4-BE49-F238E27FC236}">
-                <a16:creationId xmlns:a16="http://schemas.microsoft.com/office/drawing/2014/main" id="{22379093-2446-7E14-8100-7BE52B6E3AF4}"/>
-              </a:ext>
-            </a:extLst>
-          </p:cNvPr>
-          <p:cNvSpPr>
-            <a:spLocks noGrp="1"/>
-          </p:cNvSpPr>
-          <p:nvPr>
-            <p:ph type="body" sz="quarter" idx="12"/>
-          </p:nvPr>
-        </p:nvSpPr>
-        <p:spPr/>
-        <p:txBody>
-          <a:bodyPr/>
-          <a:lstStyle/>
-          <a:p>
-            <a:endParaRPr lang="en-US"/>
           </a:p>
         </p:txBody>
       </p:sp>
       <p:pic>
         <p:nvPicPr>
-          <p:cNvPr id="3" name="Graphic 2">
+          <p:cNvPr id="2050" name="Picture 2">
             <a:extLst>
               <a:ext uri="{FF2B5EF4-FFF2-40B4-BE49-F238E27FC236}">
-                <a16:creationId xmlns:a16="http://schemas.microsoft.com/office/drawing/2014/main" id="{D7ABBF58-9D7A-5D08-32E8-B668A6F30A87}"/>
+                <a16:creationId xmlns:a16="http://schemas.microsoft.com/office/drawing/2014/main" id="{EE8CD827-8F0D-EAED-8486-46CFB0EE61B8}"/>
+              </a:ext>
+            </a:extLst>
+          </p:cNvPr>
+          <p:cNvPicPr>
+            <a:picLocks noChangeAspect="1" noChangeArrowheads="1"/>
+          </p:cNvPicPr>
+          <p:nvPr/>
+        </p:nvPicPr>
+        <p:blipFill>
+          <a:blip r:embed="rId3">
+            <a:extLst>
+              <a:ext uri="{28A0092B-C50C-407E-A947-70E740481C1C}">
+                <a14:useLocalDpi xmlns:a14="http://schemas.microsoft.com/office/drawing/2010/main" val="0"/>
+              </a:ext>
+            </a:extLst>
+          </a:blip>
+          <a:srcRect/>
+          <a:stretch>
+            <a:fillRect/>
+          </a:stretch>
+        </p:blipFill>
+        <p:spPr bwMode="auto">
+          <a:xfrm>
+            <a:off x="8355200" y="1382748"/>
+            <a:ext cx="2926883" cy="2325144"/>
+          </a:xfrm>
+          <a:prstGeom prst="rect">
+            <a:avLst/>
+          </a:prstGeom>
+          <a:noFill/>
+          <a:extLst>
+            <a:ext uri="{909E8E84-426E-40DD-AFC4-6F175D3DCCD1}">
+              <a14:hiddenFill xmlns:a14="http://schemas.microsoft.com/office/drawing/2010/main">
+                <a:solidFill>
+                  <a:srgbClr val="FFFFFF"/>
+                </a:solidFill>
+              </a14:hiddenFill>
+            </a:ext>
+          </a:extLst>
+        </p:spPr>
+      </p:pic>
+      <p:pic>
+        <p:nvPicPr>
+          <p:cNvPr id="5" name="Graphic 4">
+            <a:extLst>
+              <a:ext uri="{FF2B5EF4-FFF2-40B4-BE49-F238E27FC236}">
+                <a16:creationId xmlns:a16="http://schemas.microsoft.com/office/drawing/2014/main" id="{790EAEBE-9956-22FA-007F-633109F25B29}"/>
               </a:ext>
             </a:extLst>
           </p:cNvPr>
@@ -8724,10 +9700,10 @@
           <p:nvPr/>
         </p:nvPicPr>
         <p:blipFill>
-          <a:blip r:embed="rId3">
+          <a:blip r:embed="rId4">
             <a:extLst>
               <a:ext uri="{96DAC541-7B7A-43D3-8B79-37D633B846F1}">
-                <asvg:svgBlip xmlns:asvg="http://schemas.microsoft.com/office/drawing/2016/SVG/main" r:embed="rId4"/>
+                <asvg:svgBlip xmlns:asvg="http://schemas.microsoft.com/office/drawing/2016/SVG/main" r:embed="rId5"/>
               </a:ext>
             </a:extLst>
           </a:blip>
@@ -8737,48 +9713,43 @@
         </p:blipFill>
         <p:spPr>
           <a:xfrm>
-            <a:off x="4842550" y="1445511"/>
-            <a:ext cx="2506896" cy="673148"/>
+            <a:off x="3276006" y="2583123"/>
+            <a:ext cx="2594796" cy="516440"/>
           </a:xfrm>
           <a:prstGeom prst="rect">
             <a:avLst/>
           </a:prstGeom>
         </p:spPr>
       </p:pic>
-      <p:pic>
-        <p:nvPicPr>
-          <p:cNvPr id="9" name="Picture 8">
+      <p:sp>
+        <p:nvSpPr>
+          <p:cNvPr id="4" name="Text Placeholder 3">
             <a:extLst>
               <a:ext uri="{FF2B5EF4-FFF2-40B4-BE49-F238E27FC236}">
-                <a16:creationId xmlns:a16="http://schemas.microsoft.com/office/drawing/2014/main" id="{F9C4A0FD-4C36-0E5B-1653-864C7CC862E2}"/>
+                <a16:creationId xmlns:a16="http://schemas.microsoft.com/office/drawing/2014/main" id="{01581E98-4578-B413-BC4F-850EC851991D}"/>
               </a:ext>
             </a:extLst>
           </p:cNvPr>
-          <p:cNvPicPr>
-            <a:picLocks noChangeAspect="1"/>
-          </p:cNvPicPr>
-          <p:nvPr/>
-        </p:nvPicPr>
-        <p:blipFill>
-          <a:blip r:embed="rId5"/>
-          <a:stretch>
-            <a:fillRect/>
-          </a:stretch>
-        </p:blipFill>
-        <p:spPr>
-          <a:xfrm>
-            <a:off x="1042232" y="2688003"/>
-            <a:ext cx="10359464" cy="3276070"/>
-          </a:xfrm>
-          <a:prstGeom prst="rect">
-            <a:avLst/>
-          </a:prstGeom>
-        </p:spPr>
-      </p:pic>
+          <p:cNvSpPr>
+            <a:spLocks noGrp="1"/>
+          </p:cNvSpPr>
+          <p:nvPr>
+            <p:ph type="body" sz="quarter" idx="12"/>
+          </p:nvPr>
+        </p:nvSpPr>
+        <p:spPr/>
+        <p:txBody>
+          <a:bodyPr/>
+          <a:lstStyle/>
+          <a:p>
+            <a:endParaRPr lang="en-US"/>
+          </a:p>
+        </p:txBody>
+      </p:sp>
     </p:spTree>
     <p:extLst>
       <p:ext uri="{BB962C8B-B14F-4D97-AF65-F5344CB8AC3E}">
-        <p14:creationId xmlns:p14="http://schemas.microsoft.com/office/powerpoint/2010/main" val="128243918"/>
+        <p14:creationId xmlns:p14="http://schemas.microsoft.com/office/powerpoint/2010/main" val="1291771005"/>
       </p:ext>
     </p:extLst>
   </p:cSld>
@@ -8830,6 +9801,170 @@
               <a:rPr lang="en-US" dirty="0">
                 <a:latin typeface="LM Sans 10" panose="00000500000000000000" pitchFamily="50" charset="0"/>
               </a:rPr>
+              <a:t>Velocity </a:t>
+            </a:r>
+            <a:r>
+              <a:rPr lang="en-US" dirty="0" err="1">
+                <a:latin typeface="LM Sans 10" panose="00000500000000000000" pitchFamily="50" charset="0"/>
+              </a:rPr>
+              <a:t>Verlet</a:t>
+            </a:r>
+            <a:r>
+              <a:rPr lang="en-US" dirty="0">
+                <a:latin typeface="LM Sans 10" panose="00000500000000000000" pitchFamily="50" charset="0"/>
+              </a:rPr>
+              <a:t> method for box simulation</a:t>
+            </a:r>
+            <a:endParaRPr lang="uk-UA" dirty="0"/>
+          </a:p>
+        </p:txBody>
+      </p:sp>
+      <p:sp>
+        <p:nvSpPr>
+          <p:cNvPr id="4" name="Text Placeholder 3">
+            <a:extLst>
+              <a:ext uri="{FF2B5EF4-FFF2-40B4-BE49-F238E27FC236}">
+                <a16:creationId xmlns:a16="http://schemas.microsoft.com/office/drawing/2014/main" id="{22379093-2446-7E14-8100-7BE52B6E3AF4}"/>
+              </a:ext>
+            </a:extLst>
+          </p:cNvPr>
+          <p:cNvSpPr>
+            <a:spLocks noGrp="1"/>
+          </p:cNvSpPr>
+          <p:nvPr>
+            <p:ph type="body" sz="quarter" idx="12"/>
+          </p:nvPr>
+        </p:nvSpPr>
+        <p:spPr/>
+        <p:txBody>
+          <a:bodyPr/>
+          <a:lstStyle/>
+          <a:p>
+            <a:endParaRPr lang="en-US"/>
+          </a:p>
+        </p:txBody>
+      </p:sp>
+      <p:pic>
+        <p:nvPicPr>
+          <p:cNvPr id="3" name="Graphic 2">
+            <a:extLst>
+              <a:ext uri="{FF2B5EF4-FFF2-40B4-BE49-F238E27FC236}">
+                <a16:creationId xmlns:a16="http://schemas.microsoft.com/office/drawing/2014/main" id="{D7ABBF58-9D7A-5D08-32E8-B668A6F30A87}"/>
+              </a:ext>
+            </a:extLst>
+          </p:cNvPr>
+          <p:cNvPicPr>
+            <a:picLocks noChangeAspect="1"/>
+          </p:cNvPicPr>
+          <p:nvPr/>
+        </p:nvPicPr>
+        <p:blipFill>
+          <a:blip r:embed="rId3">
+            <a:extLst>
+              <a:ext uri="{96DAC541-7B7A-43D3-8B79-37D633B846F1}">
+                <asvg:svgBlip xmlns:asvg="http://schemas.microsoft.com/office/drawing/2016/SVG/main" r:embed="rId4"/>
+              </a:ext>
+            </a:extLst>
+          </a:blip>
+          <a:stretch>
+            <a:fillRect/>
+          </a:stretch>
+        </p:blipFill>
+        <p:spPr>
+          <a:xfrm>
+            <a:off x="4842550" y="1445511"/>
+            <a:ext cx="2506896" cy="673148"/>
+          </a:xfrm>
+          <a:prstGeom prst="rect">
+            <a:avLst/>
+          </a:prstGeom>
+        </p:spPr>
+      </p:pic>
+      <p:pic>
+        <p:nvPicPr>
+          <p:cNvPr id="9" name="Picture 8">
+            <a:extLst>
+              <a:ext uri="{FF2B5EF4-FFF2-40B4-BE49-F238E27FC236}">
+                <a16:creationId xmlns:a16="http://schemas.microsoft.com/office/drawing/2014/main" id="{F9C4A0FD-4C36-0E5B-1653-864C7CC862E2}"/>
+              </a:ext>
+            </a:extLst>
+          </p:cNvPr>
+          <p:cNvPicPr>
+            <a:picLocks noChangeAspect="1"/>
+          </p:cNvPicPr>
+          <p:nvPr/>
+        </p:nvPicPr>
+        <p:blipFill>
+          <a:blip r:embed="rId5"/>
+          <a:stretch>
+            <a:fillRect/>
+          </a:stretch>
+        </p:blipFill>
+        <p:spPr>
+          <a:xfrm>
+            <a:off x="1042232" y="2688003"/>
+            <a:ext cx="10359464" cy="3276070"/>
+          </a:xfrm>
+          <a:prstGeom prst="rect">
+            <a:avLst/>
+          </a:prstGeom>
+        </p:spPr>
+      </p:pic>
+    </p:spTree>
+    <p:extLst>
+      <p:ext uri="{BB962C8B-B14F-4D97-AF65-F5344CB8AC3E}">
+        <p14:creationId xmlns:p14="http://schemas.microsoft.com/office/powerpoint/2010/main" val="128243918"/>
+      </p:ext>
+    </p:extLst>
+  </p:cSld>
+  <p:clrMapOvr>
+    <a:masterClrMapping/>
+  </p:clrMapOvr>
+</p:sld>
+</file>
+
+<file path=ppt/slides/slide7.xml><?xml version="1.0" encoding="utf-8"?>
+<p:sld xmlns:a="http://schemas.openxmlformats.org/drawingml/2006/main" xmlns:r="http://schemas.openxmlformats.org/officeDocument/2006/relationships" xmlns:p="http://schemas.openxmlformats.org/presentationml/2006/main">
+  <p:cSld>
+    <p:spTree>
+      <p:nvGrpSpPr>
+        <p:cNvPr id="1" name=""/>
+        <p:cNvGrpSpPr/>
+        <p:nvPr/>
+      </p:nvGrpSpPr>
+      <p:grpSpPr>
+        <a:xfrm>
+          <a:off x="0" y="0"/>
+          <a:ext cx="0" cy="0"/>
+          <a:chOff x="0" y="0"/>
+          <a:chExt cx="0" cy="0"/>
+        </a:xfrm>
+      </p:grpSpPr>
+      <p:sp>
+        <p:nvSpPr>
+          <p:cNvPr id="2" name="Title 1">
+            <a:extLst>
+              <a:ext uri="{FF2B5EF4-FFF2-40B4-BE49-F238E27FC236}">
+                <a16:creationId xmlns:a16="http://schemas.microsoft.com/office/drawing/2014/main" id="{D2AAFA58-9F0A-4217-B38D-E58CFC4CAD2A}"/>
+              </a:ext>
+            </a:extLst>
+          </p:cNvPr>
+          <p:cNvSpPr>
+            <a:spLocks noGrp="1"/>
+          </p:cNvSpPr>
+          <p:nvPr>
+            <p:ph type="title"/>
+          </p:nvPr>
+        </p:nvSpPr>
+        <p:spPr/>
+        <p:txBody>
+          <a:bodyPr/>
+          <a:lstStyle/>
+          <a:p>
+            <a:r>
+              <a:rPr lang="en-US" dirty="0">
+                <a:latin typeface="LM Sans 10" panose="00000500000000000000" pitchFamily="50" charset="0"/>
+              </a:rPr>
               <a:t>Forces</a:t>
             </a:r>
             <a:endParaRPr lang="uk-UA" dirty="0"/>
@@ -8988,7 +10123,7 @@
 </p:sld>
 </file>
 
-<file path=ppt/slides/slide7.xml><?xml version="1.0" encoding="utf-8"?>
+<file path=ppt/slides/slide8.xml><?xml version="1.0" encoding="utf-8"?>
 <p:sld xmlns:a="http://schemas.openxmlformats.org/drawingml/2006/main" xmlns:r="http://schemas.openxmlformats.org/officeDocument/2006/relationships" xmlns:p="http://schemas.openxmlformats.org/presentationml/2006/main">
   <p:cSld>
     <p:spTree>
@@ -10171,221 +11306,6 @@
 </p:sld>
 </file>
 
-<file path=ppt/slides/slide8.xml><?xml version="1.0" encoding="utf-8"?>
-<p:sld xmlns:a="http://schemas.openxmlformats.org/drawingml/2006/main" xmlns:r="http://schemas.openxmlformats.org/officeDocument/2006/relationships" xmlns:p="http://schemas.openxmlformats.org/presentationml/2006/main">
-  <p:cSld>
-    <p:spTree>
-      <p:nvGrpSpPr>
-        <p:cNvPr id="1" name=""/>
-        <p:cNvGrpSpPr/>
-        <p:nvPr/>
-      </p:nvGrpSpPr>
-      <p:grpSpPr>
-        <a:xfrm>
-          <a:off x="0" y="0"/>
-          <a:ext cx="0" cy="0"/>
-          <a:chOff x="0" y="0"/>
-          <a:chExt cx="0" cy="0"/>
-        </a:xfrm>
-      </p:grpSpPr>
-      <p:sp>
-        <p:nvSpPr>
-          <p:cNvPr id="2" name="Title 1">
-            <a:extLst>
-              <a:ext uri="{FF2B5EF4-FFF2-40B4-BE49-F238E27FC236}">
-                <a16:creationId xmlns:a16="http://schemas.microsoft.com/office/drawing/2014/main" id="{D2AAFA58-9F0A-4217-B38D-E58CFC4CAD2A}"/>
-              </a:ext>
-            </a:extLst>
-          </p:cNvPr>
-          <p:cNvSpPr>
-            <a:spLocks noGrp="1"/>
-          </p:cNvSpPr>
-          <p:nvPr>
-            <p:ph type="title"/>
-          </p:nvPr>
-        </p:nvSpPr>
-        <p:spPr/>
-        <p:txBody>
-          <a:bodyPr/>
-          <a:lstStyle/>
-          <a:p>
-            <a:r>
-              <a:rPr lang="en-US" dirty="0">
-                <a:latin typeface="LM Sans 10" panose="00000500000000000000" pitchFamily="50" charset="0"/>
-              </a:rPr>
-              <a:t>Example: Lennard-Jones fluid</a:t>
-            </a:r>
-            <a:endParaRPr lang="uk-UA" dirty="0"/>
-          </a:p>
-        </p:txBody>
-      </p:sp>
-      <p:sp>
-        <p:nvSpPr>
-          <p:cNvPr id="9" name="Text Placeholder 8">
-            <a:extLst>
-              <a:ext uri="{FF2B5EF4-FFF2-40B4-BE49-F238E27FC236}">
-                <a16:creationId xmlns:a16="http://schemas.microsoft.com/office/drawing/2014/main" id="{E0A634D6-FCFD-4BC3-BC26-887CBFED769C}"/>
-              </a:ext>
-            </a:extLst>
-          </p:cNvPr>
-          <p:cNvSpPr>
-            <a:spLocks noGrp="1"/>
-          </p:cNvSpPr>
-          <p:nvPr>
-            <p:ph type="body" sz="quarter" idx="12"/>
-          </p:nvPr>
-        </p:nvSpPr>
-        <p:spPr/>
-        <p:txBody>
-          <a:bodyPr/>
-          <a:lstStyle/>
-          <a:p>
-            <a:r>
-              <a:rPr lang="en-US" dirty="0"/>
-              <a:t>8</a:t>
-            </a:r>
-          </a:p>
-        </p:txBody>
-      </p:sp>
-      <p:pic>
-        <p:nvPicPr>
-          <p:cNvPr id="4" name="Picture 3">
-            <a:extLst>
-              <a:ext uri="{FF2B5EF4-FFF2-40B4-BE49-F238E27FC236}">
-                <a16:creationId xmlns:a16="http://schemas.microsoft.com/office/drawing/2014/main" id="{413FCD96-9F93-DD6F-735C-1AB4C476F4D5}"/>
-              </a:ext>
-            </a:extLst>
-          </p:cNvPr>
-          <p:cNvPicPr>
-            <a:picLocks noChangeAspect="1"/>
-          </p:cNvPicPr>
-          <p:nvPr/>
-        </p:nvPicPr>
-        <p:blipFill>
-          <a:blip r:embed="rId3"/>
-          <a:stretch>
-            <a:fillRect/>
-          </a:stretch>
-        </p:blipFill>
-        <p:spPr>
-          <a:xfrm>
-            <a:off x="4881854" y="1318302"/>
-            <a:ext cx="2428292" cy="610582"/>
-          </a:xfrm>
-          <a:prstGeom prst="rect">
-            <a:avLst/>
-          </a:prstGeom>
-        </p:spPr>
-      </p:pic>
-      <p:pic>
-        <p:nvPicPr>
-          <p:cNvPr id="5" name="Picture 4">
-            <a:extLst>
-              <a:ext uri="{FF2B5EF4-FFF2-40B4-BE49-F238E27FC236}">
-                <a16:creationId xmlns:a16="http://schemas.microsoft.com/office/drawing/2014/main" id="{32F99E8F-5FEC-4AB0-B2C2-2AAAD171F23F}"/>
-              </a:ext>
-            </a:extLst>
-          </p:cNvPr>
-          <p:cNvPicPr>
-            <a:picLocks noChangeAspect="1"/>
-          </p:cNvPicPr>
-          <p:nvPr/>
-        </p:nvPicPr>
-        <p:blipFill>
-          <a:blip r:embed="rId4"/>
-          <a:stretch>
-            <a:fillRect/>
-          </a:stretch>
-        </p:blipFill>
-        <p:spPr>
-          <a:xfrm>
-            <a:off x="3002563" y="2273169"/>
-            <a:ext cx="6186874" cy="2586723"/>
-          </a:xfrm>
-          <a:prstGeom prst="rect">
-            <a:avLst/>
-          </a:prstGeom>
-        </p:spPr>
-      </p:pic>
-      <p:sp>
-        <p:nvSpPr>
-          <p:cNvPr id="6" name="Rectangle 5">
-            <a:extLst>
-              <a:ext uri="{FF2B5EF4-FFF2-40B4-BE49-F238E27FC236}">
-                <a16:creationId xmlns:a16="http://schemas.microsoft.com/office/drawing/2014/main" id="{15699EA9-2A57-3419-3271-76BA943C2A05}"/>
-              </a:ext>
-            </a:extLst>
-          </p:cNvPr>
-          <p:cNvSpPr/>
-          <p:nvPr/>
-        </p:nvSpPr>
-        <p:spPr>
-          <a:xfrm>
-            <a:off x="913556" y="5359274"/>
-            <a:ext cx="8949226" cy="707886"/>
-          </a:xfrm>
-          <a:prstGeom prst="rect">
-            <a:avLst/>
-          </a:prstGeom>
-        </p:spPr>
-        <p:txBody>
-          <a:bodyPr wrap="square">
-            <a:spAutoFit/>
-          </a:bodyPr>
-          <a:lstStyle/>
-          <a:p>
-            <a:pPr algn="just">
-              <a:spcAft>
-                <a:spcPts val="600"/>
-              </a:spcAft>
-              <a:buClr>
-                <a:srgbClr val="0808FF"/>
-              </a:buClr>
-            </a:pPr>
-            <a:r>
-              <a:rPr lang="en-US" sz="2000" dirty="0"/>
-              <a:t>Both the potential and the gradient term can be expressed in terms of |r</a:t>
-            </a:r>
-            <a:r>
-              <a:rPr lang="en-US" sz="2000" baseline="-25000" dirty="0"/>
-              <a:t>i</a:t>
-            </a:r>
-            <a:r>
-              <a:rPr lang="en-US" sz="2000" dirty="0"/>
-              <a:t>-r</a:t>
-            </a:r>
-            <a:r>
-              <a:rPr lang="en-US" sz="2000" baseline="-25000" dirty="0"/>
-              <a:t>j</a:t>
-            </a:r>
-            <a:r>
-              <a:rPr lang="en-US" sz="2000" dirty="0"/>
-              <a:t>|</a:t>
-            </a:r>
-            <a:r>
-              <a:rPr lang="en-US" sz="2000" baseline="30000" dirty="0"/>
-              <a:t>2</a:t>
-            </a:r>
-            <a:r>
-              <a:rPr lang="en-US" sz="2000" dirty="0"/>
-              <a:t>, saves the unnecessary computation of the square root</a:t>
-            </a:r>
-          </a:p>
-        </p:txBody>
-      </p:sp>
-    </p:spTree>
-    <p:extLst>
-      <p:ext uri="{BB962C8B-B14F-4D97-AF65-F5344CB8AC3E}">
-        <p14:creationId xmlns:p14="http://schemas.microsoft.com/office/powerpoint/2010/main" val="4250052144"/>
-      </p:ext>
-    </p:extLst>
-  </p:cSld>
-  <p:clrMapOvr>
-    <a:masterClrMapping/>
-  </p:clrMapOvr>
-</p:sld>
-</file>
-
 <file path=ppt/slides/slide9.xml><?xml version="1.0" encoding="utf-8"?>
 <p:sld xmlns:a="http://schemas.openxmlformats.org/drawingml/2006/main" xmlns:r="http://schemas.openxmlformats.org/officeDocument/2006/relationships" xmlns:p="http://schemas.openxmlformats.org/presentationml/2006/main">
   <p:cSld>
@@ -10428,7 +11348,7 @@
               <a:rPr lang="en-US" dirty="0">
                 <a:latin typeface="LM Sans 10" panose="00000500000000000000" pitchFamily="50" charset="0"/>
               </a:rPr>
-              <a:t>Simulation: Initial conditions</a:t>
+              <a:t>Example: Lennard-Jones fluid</a:t>
             </a:r>
             <a:endParaRPr lang="uk-UA" dirty="0"/>
           </a:p>
@@ -10436,10 +11356,10 @@
       </p:sp>
       <p:sp>
         <p:nvSpPr>
-          <p:cNvPr id="4" name="Text Placeholder 3">
+          <p:cNvPr id="9" name="Text Placeholder 8">
             <a:extLst>
               <a:ext uri="{FF2B5EF4-FFF2-40B4-BE49-F238E27FC236}">
-                <a16:creationId xmlns:a16="http://schemas.microsoft.com/office/drawing/2014/main" id="{22379093-2446-7E14-8100-7BE52B6E3AF4}"/>
+                <a16:creationId xmlns:a16="http://schemas.microsoft.com/office/drawing/2014/main" id="{E0A634D6-FCFD-4BC3-BC26-887CBFED769C}"/>
               </a:ext>
             </a:extLst>
           </p:cNvPr>
@@ -10455,299 +11375,49 @@
           <a:bodyPr/>
           <a:lstStyle/>
           <a:p>
-            <a:endParaRPr lang="en-US"/>
-          </a:p>
-        </p:txBody>
-      </p:sp>
-      <p:sp>
-        <p:nvSpPr>
-          <p:cNvPr id="5" name="Rectangle 4">
+            <a:r>
+              <a:rPr lang="en-US" dirty="0"/>
+              <a:t>8</a:t>
+            </a:r>
+          </a:p>
+        </p:txBody>
+      </p:sp>
+      <p:pic>
+        <p:nvPicPr>
+          <p:cNvPr id="4" name="Picture 3">
             <a:extLst>
               <a:ext uri="{FF2B5EF4-FFF2-40B4-BE49-F238E27FC236}">
-                <a16:creationId xmlns:a16="http://schemas.microsoft.com/office/drawing/2014/main" id="{413D0C7C-906D-884B-F42E-8F17A179BC22}"/>
+                <a16:creationId xmlns:a16="http://schemas.microsoft.com/office/drawing/2014/main" id="{413FCD96-9F93-DD6F-735C-1AB4C476F4D5}"/>
               </a:ext>
             </a:extLst>
           </p:cNvPr>
-          <p:cNvSpPr/>
+          <p:cNvPicPr>
+            <a:picLocks noChangeAspect="1"/>
+          </p:cNvPicPr>
           <p:nvPr/>
-        </p:nvSpPr>
+        </p:nvPicPr>
+        <p:blipFill>
+          <a:blip r:embed="rId3"/>
+          <a:stretch>
+            <a:fillRect/>
+          </a:stretch>
+        </p:blipFill>
         <p:spPr>
           <a:xfrm>
-            <a:off x="767980" y="1251691"/>
-            <a:ext cx="8949226" cy="400110"/>
+            <a:off x="4881854" y="1318302"/>
+            <a:ext cx="2428292" cy="610582"/>
           </a:xfrm>
           <a:prstGeom prst="rect">
             <a:avLst/>
           </a:prstGeom>
         </p:spPr>
-        <p:txBody>
-          <a:bodyPr wrap="square">
-            <a:spAutoFit/>
-          </a:bodyPr>
-          <a:lstStyle/>
-          <a:p>
-            <a:pPr algn="just">
-              <a:spcAft>
-                <a:spcPts val="600"/>
-              </a:spcAft>
-              <a:buClr>
-                <a:srgbClr val="0808FF"/>
-              </a:buClr>
-            </a:pPr>
-            <a:r>
-              <a:rPr lang="en-US" sz="2000" dirty="0"/>
-              <a:t>We have to initialize the system with initial positions and velocities </a:t>
-            </a:r>
-          </a:p>
-        </p:txBody>
-      </p:sp>
-      <mc:AlternateContent xmlns:mc="http://schemas.openxmlformats.org/markup-compatibility/2006">
-        <mc:Choice xmlns:a14="http://schemas.microsoft.com/office/drawing/2010/main" Requires="a14">
-          <p:sp>
-            <p:nvSpPr>
-              <p:cNvPr id="3" name="Rectangle 2">
-                <a:extLst>
-                  <a:ext uri="{FF2B5EF4-FFF2-40B4-BE49-F238E27FC236}">
-                    <a16:creationId xmlns:a16="http://schemas.microsoft.com/office/drawing/2014/main" id="{5E12AD3C-1994-608C-C002-36764A0F17EB}"/>
-                  </a:ext>
-                </a:extLst>
-              </p:cNvPr>
-              <p:cNvSpPr/>
-              <p:nvPr/>
-            </p:nvSpPr>
-            <p:spPr>
-              <a:xfrm>
-                <a:off x="767980" y="1777130"/>
-                <a:ext cx="6165083" cy="3859967"/>
-              </a:xfrm>
-              <a:prstGeom prst="rect">
-                <a:avLst/>
-              </a:prstGeom>
-            </p:spPr>
-            <p:txBody>
-              <a:bodyPr wrap="square">
-                <a:spAutoFit/>
-              </a:bodyPr>
-              <a:lstStyle/>
-              <a:p>
-                <a:pPr marL="342900" indent="-342900" algn="just">
-                  <a:spcAft>
-                    <a:spcPts val="600"/>
-                  </a:spcAft>
-                  <a:buClr>
-                    <a:srgbClr val="0808FF"/>
-                  </a:buClr>
-                  <a:buFont typeface="Arial" panose="020B0604020202020204" pitchFamily="34" charset="0"/>
-                  <a:buChar char="•"/>
-                </a:pPr>
-                <a:r>
-                  <a:rPr lang="en-US" sz="2000" dirty="0"/>
-                  <a:t>Coordinates</a:t>
-                </a:r>
-              </a:p>
-              <a:p>
-                <a:pPr marL="800100" lvl="1" indent="-342900" algn="just">
-                  <a:spcAft>
-                    <a:spcPts val="600"/>
-                  </a:spcAft>
-                  <a:buClr>
-                    <a:srgbClr val="0808FF"/>
-                  </a:buClr>
-                  <a:buFont typeface="Arial" panose="020B0604020202020204" pitchFamily="34" charset="0"/>
-                  <a:buChar char="•"/>
-                </a:pPr>
-                <a:r>
-                  <a:rPr lang="en-US" sz="2000" dirty="0"/>
-                  <a:t>Put particles in a grid</a:t>
-                </a:r>
-              </a:p>
-              <a:p>
-                <a:pPr marL="800100" lvl="1" indent="-342900" algn="just">
-                  <a:spcAft>
-                    <a:spcPts val="600"/>
-                  </a:spcAft>
-                  <a:buClr>
-                    <a:srgbClr val="0808FF"/>
-                  </a:buClr>
-                  <a:buFont typeface="Arial" panose="020B0604020202020204" pitchFamily="34" charset="0"/>
-                  <a:buChar char="•"/>
-                </a:pPr>
-                <a:r>
-                  <a:rPr lang="en-US" sz="2000" dirty="0"/>
-                  <a:t>Avoids particle overlap (mind the </a:t>
-                </a:r>
-                <a14:m>
-                  <m:oMath xmlns:m="http://schemas.openxmlformats.org/officeDocument/2006/math">
-                    <m:sSup>
-                      <m:sSupPr>
-                        <m:ctrlPr>
-                          <a:rPr lang="en-US" sz="2000" b="0" i="1" smtClean="0">
-                            <a:latin typeface="Cambria Math" panose="02040503050406030204" pitchFamily="18" charset="0"/>
-                          </a:rPr>
-                        </m:ctrlPr>
-                      </m:sSupPr>
-                      <m:e>
-                        <m:r>
-                          <a:rPr lang="en-US" sz="2000" b="0" i="1" smtClean="0">
-                            <a:latin typeface="Cambria Math" panose="02040503050406030204" pitchFamily="18" charset="0"/>
-                          </a:rPr>
-                          <m:t>𝑟</m:t>
-                        </m:r>
-                      </m:e>
-                      <m:sup>
-                        <m:r>
-                          <a:rPr lang="en-US" sz="2000" b="0" i="1" smtClean="0">
-                            <a:latin typeface="Cambria Math" panose="02040503050406030204" pitchFamily="18" charset="0"/>
-                          </a:rPr>
-                          <m:t>−12</m:t>
-                        </m:r>
-                      </m:sup>
-                    </m:sSup>
-                  </m:oMath>
-                </a14:m>
-                <a:r>
-                  <a:rPr lang="en-US" sz="2000" dirty="0"/>
-                  <a:t> term)</a:t>
-                </a:r>
-              </a:p>
-              <a:p>
-                <a:pPr marL="800100" lvl="1" indent="-342900" algn="just">
-                  <a:spcAft>
-                    <a:spcPts val="600"/>
-                  </a:spcAft>
-                  <a:buClr>
-                    <a:srgbClr val="0808FF"/>
-                  </a:buClr>
-                  <a:buFont typeface="Arial" panose="020B0604020202020204" pitchFamily="34" charset="0"/>
-                  <a:buChar char="•"/>
-                </a:pPr>
-                <a:endParaRPr lang="en-US" sz="2000" dirty="0"/>
-              </a:p>
-              <a:p>
-                <a:pPr marL="800100" lvl="1" indent="-342900" algn="just">
-                  <a:spcAft>
-                    <a:spcPts val="600"/>
-                  </a:spcAft>
-                  <a:buClr>
-                    <a:srgbClr val="0808FF"/>
-                  </a:buClr>
-                  <a:buFont typeface="Arial" panose="020B0604020202020204" pitchFamily="34" charset="0"/>
-                  <a:buChar char="•"/>
-                </a:pPr>
-                <a:endParaRPr lang="en-US" sz="2000" dirty="0"/>
-              </a:p>
-              <a:p>
-                <a:pPr marL="800100" lvl="1" indent="-342900" algn="just">
-                  <a:spcAft>
-                    <a:spcPts val="600"/>
-                  </a:spcAft>
-                  <a:buClr>
-                    <a:srgbClr val="0808FF"/>
-                  </a:buClr>
-                  <a:buFont typeface="Arial" panose="020B0604020202020204" pitchFamily="34" charset="0"/>
-                  <a:buChar char="•"/>
-                </a:pPr>
-                <a:endParaRPr lang="en-US" sz="2000" dirty="0"/>
-              </a:p>
-              <a:p>
-                <a:pPr marL="800100" lvl="1" indent="-342900" algn="just">
-                  <a:spcAft>
-                    <a:spcPts val="600"/>
-                  </a:spcAft>
-                  <a:buClr>
-                    <a:srgbClr val="0808FF"/>
-                  </a:buClr>
-                  <a:buFont typeface="Arial" panose="020B0604020202020204" pitchFamily="34" charset="0"/>
-                  <a:buChar char="•"/>
-                </a:pPr>
-                <a:endParaRPr lang="en-US" sz="2000" dirty="0"/>
-              </a:p>
-              <a:p>
-                <a:pPr marL="342900" indent="-342900" algn="just">
-                  <a:spcAft>
-                    <a:spcPts val="600"/>
-                  </a:spcAft>
-                  <a:buClr>
-                    <a:srgbClr val="0808FF"/>
-                  </a:buClr>
-                  <a:buFont typeface="Arial" panose="020B0604020202020204" pitchFamily="34" charset="0"/>
-                  <a:buChar char="•"/>
-                </a:pPr>
-                <a:r>
-                  <a:rPr lang="en-US" sz="2000" dirty="0"/>
-                  <a:t>Velocities</a:t>
-                </a:r>
-              </a:p>
-              <a:p>
-                <a:pPr marL="800100" lvl="1" indent="-342900" algn="just">
-                  <a:spcAft>
-                    <a:spcPts val="600"/>
-                  </a:spcAft>
-                  <a:buClr>
-                    <a:srgbClr val="0808FF"/>
-                  </a:buClr>
-                  <a:buFont typeface="Arial" panose="020B0604020202020204" pitchFamily="34" charset="0"/>
-                  <a:buChar char="•"/>
-                </a:pPr>
-                <a:r>
-                  <a:rPr lang="en-US" sz="2000" dirty="0"/>
-                  <a:t>Sample each component from Gaussian (Maxwell-Boltzmann) distribution</a:t>
-                </a:r>
-              </a:p>
-            </p:txBody>
-          </p:sp>
-        </mc:Choice>
-        <mc:Fallback>
-          <p:sp>
-            <p:nvSpPr>
-              <p:cNvPr id="3" name="Rectangle 2">
-                <a:extLst>
-                  <a:ext uri="{FF2B5EF4-FFF2-40B4-BE49-F238E27FC236}">
-                    <a16:creationId xmlns:a16="http://schemas.microsoft.com/office/drawing/2014/main" id="{5E12AD3C-1994-608C-C002-36764A0F17EB}"/>
-                  </a:ext>
-                </a:extLst>
-              </p:cNvPr>
-              <p:cNvSpPr>
-                <a:spLocks noRot="1" noChangeAspect="1" noMove="1" noResize="1" noEditPoints="1" noAdjustHandles="1" noChangeArrowheads="1" noChangeShapeType="1" noTextEdit="1"/>
-              </p:cNvSpPr>
-              <p:nvPr/>
-            </p:nvSpPr>
-            <p:spPr>
-              <a:xfrm>
-                <a:off x="767980" y="1777130"/>
-                <a:ext cx="6165083" cy="3859967"/>
-              </a:xfrm>
-              <a:prstGeom prst="rect">
-                <a:avLst/>
-              </a:prstGeom>
-              <a:blipFill>
-                <a:blip r:embed="rId3"/>
-                <a:stretch>
-                  <a:fillRect l="-823" t="-984" r="-1235"/>
-                </a:stretch>
-              </a:blipFill>
-            </p:spPr>
-            <p:txBody>
-              <a:bodyPr/>
-              <a:lstStyle/>
-              <a:p>
-                <a:r>
-                  <a:rPr lang="en-US">
-                    <a:noFill/>
-                  </a:rPr>
-                  <a:t> </a:t>
-                </a:r>
-              </a:p>
-            </p:txBody>
-          </p:sp>
-        </mc:Fallback>
-      </mc:AlternateContent>
+      </p:pic>
       <p:pic>
         <p:nvPicPr>
-          <p:cNvPr id="8" name="Picture 7">
+          <p:cNvPr id="5" name="Picture 4">
             <a:extLst>
               <a:ext uri="{FF2B5EF4-FFF2-40B4-BE49-F238E27FC236}">
-                <a16:creationId xmlns:a16="http://schemas.microsoft.com/office/drawing/2014/main" id="{746C2BF3-A322-92BF-9A6A-C64D7A913774}"/>
+                <a16:creationId xmlns:a16="http://schemas.microsoft.com/office/drawing/2014/main" id="{32F99E8F-5FEC-4AB0-B2C2-2AAAD171F23F}"/>
               </a:ext>
             </a:extLst>
           </p:cNvPr>
@@ -10764,48 +11434,84 @@
         </p:blipFill>
         <p:spPr>
           <a:xfrm>
-            <a:off x="7841770" y="2091634"/>
-            <a:ext cx="3532507" cy="1932265"/>
+            <a:off x="3002563" y="2273169"/>
+            <a:ext cx="6186874" cy="2586723"/>
           </a:xfrm>
           <a:prstGeom prst="rect">
             <a:avLst/>
           </a:prstGeom>
         </p:spPr>
       </p:pic>
-      <p:pic>
-        <p:nvPicPr>
-          <p:cNvPr id="9" name="Picture 8">
+      <p:sp>
+        <p:nvSpPr>
+          <p:cNvPr id="6" name="Rectangle 5">
             <a:extLst>
               <a:ext uri="{FF2B5EF4-FFF2-40B4-BE49-F238E27FC236}">
-                <a16:creationId xmlns:a16="http://schemas.microsoft.com/office/drawing/2014/main" id="{91CB83CD-4C2A-2951-3047-FB81CA877047}"/>
+                <a16:creationId xmlns:a16="http://schemas.microsoft.com/office/drawing/2014/main" id="{15699EA9-2A57-3419-3271-76BA943C2A05}"/>
               </a:ext>
             </a:extLst>
           </p:cNvPr>
-          <p:cNvPicPr>
-            <a:picLocks noChangeAspect="1"/>
-          </p:cNvPicPr>
+          <p:cNvSpPr/>
           <p:nvPr/>
-        </p:nvPicPr>
-        <p:blipFill>
-          <a:blip r:embed="rId5"/>
-          <a:stretch>
-            <a:fillRect/>
-          </a:stretch>
-        </p:blipFill>
+        </p:nvSpPr>
         <p:spPr>
           <a:xfrm>
-            <a:off x="1352868" y="5946153"/>
-            <a:ext cx="6711218" cy="342909"/>
+            <a:off x="913556" y="5359274"/>
+            <a:ext cx="8949226" cy="707886"/>
           </a:xfrm>
           <a:prstGeom prst="rect">
             <a:avLst/>
           </a:prstGeom>
         </p:spPr>
-      </p:pic>
+        <p:txBody>
+          <a:bodyPr wrap="square">
+            <a:spAutoFit/>
+          </a:bodyPr>
+          <a:lstStyle/>
+          <a:p>
+            <a:pPr algn="just">
+              <a:spcAft>
+                <a:spcPts val="600"/>
+              </a:spcAft>
+              <a:buClr>
+                <a:srgbClr val="0808FF"/>
+              </a:buClr>
+            </a:pPr>
+            <a:r>
+              <a:rPr lang="en-US" sz="2000" dirty="0"/>
+              <a:t>Both the potential and the gradient term can be expressed in terms of |r</a:t>
+            </a:r>
+            <a:r>
+              <a:rPr lang="en-US" sz="2000" baseline="-25000" dirty="0"/>
+              <a:t>i</a:t>
+            </a:r>
+            <a:r>
+              <a:rPr lang="en-US" sz="2000" dirty="0"/>
+              <a:t>-r</a:t>
+            </a:r>
+            <a:r>
+              <a:rPr lang="en-US" sz="2000" baseline="-25000" dirty="0"/>
+              <a:t>j</a:t>
+            </a:r>
+            <a:r>
+              <a:rPr lang="en-US" sz="2000" dirty="0"/>
+              <a:t>|</a:t>
+            </a:r>
+            <a:r>
+              <a:rPr lang="en-US" sz="2000" baseline="30000" dirty="0"/>
+              <a:t>2</a:t>
+            </a:r>
+            <a:r>
+              <a:rPr lang="en-US" sz="2000" dirty="0"/>
+              <a:t>, saves the unnecessary computation of the square root</a:t>
+            </a:r>
+          </a:p>
+        </p:txBody>
+      </p:sp>
     </p:spTree>
     <p:extLst>
       <p:ext uri="{BB962C8B-B14F-4D97-AF65-F5344CB8AC3E}">
-        <p14:creationId xmlns:p14="http://schemas.microsoft.com/office/powerpoint/2010/main" val="809637653"/>
+        <p14:creationId xmlns:p14="http://schemas.microsoft.com/office/powerpoint/2010/main" val="4250052144"/>
       </p:ext>
     </p:extLst>
   </p:cSld>

</xml_diff>